<commit_message>
PML + TFSF dans présentation
</commit_message>
<xml_diff>
--- a/Oral/Présentation_Eq11.pptx
+++ b/Oral/Présentation_Eq11.pptx
@@ -11,18 +11,20 @@
     <p:sldId id="272" r:id="rId5"/>
     <p:sldId id="259" r:id="rId6"/>
     <p:sldId id="273" r:id="rId7"/>
-    <p:sldId id="260" r:id="rId8"/>
-    <p:sldId id="261" r:id="rId9"/>
-    <p:sldId id="262" r:id="rId10"/>
-    <p:sldId id="263" r:id="rId11"/>
-    <p:sldId id="264" r:id="rId12"/>
-    <p:sldId id="265" r:id="rId13"/>
-    <p:sldId id="266" r:id="rId14"/>
-    <p:sldId id="267" r:id="rId15"/>
-    <p:sldId id="268" r:id="rId16"/>
-    <p:sldId id="269" r:id="rId17"/>
-    <p:sldId id="270" r:id="rId18"/>
-    <p:sldId id="271" r:id="rId19"/>
+    <p:sldId id="274" r:id="rId8"/>
+    <p:sldId id="260" r:id="rId9"/>
+    <p:sldId id="261" r:id="rId10"/>
+    <p:sldId id="275" r:id="rId11"/>
+    <p:sldId id="262" r:id="rId12"/>
+    <p:sldId id="263" r:id="rId13"/>
+    <p:sldId id="264" r:id="rId14"/>
+    <p:sldId id="265" r:id="rId15"/>
+    <p:sldId id="266" r:id="rId16"/>
+    <p:sldId id="267" r:id="rId17"/>
+    <p:sldId id="268" r:id="rId18"/>
+    <p:sldId id="269" r:id="rId19"/>
+    <p:sldId id="270" r:id="rId20"/>
+    <p:sldId id="271" r:id="rId21"/>
   </p:sldIdLst>
   <p:sldSz cx="12192000" cy="6858000"/>
   <p:notesSz cx="6858000" cy="9144000"/>
@@ -132,12 +134,14 @@
             <p14:sldId id="272"/>
             <p14:sldId id="259"/>
             <p14:sldId id="273"/>
+            <p14:sldId id="274"/>
             <p14:sldId id="260"/>
           </p14:sldIdLst>
         </p14:section>
         <p14:section name="Section 2 : Description de la méthode numérique" id="{0C56ED26-4511-477D-B264-2823014FD2B4}">
           <p14:sldIdLst>
             <p14:sldId id="261"/>
+            <p14:sldId id="275"/>
             <p14:sldId id="262"/>
             <p14:sldId id="263"/>
           </p14:sldIdLst>
@@ -173,6 +177,32 @@
     </p:ext>
   </p:extLst>
 </p:presentation>
+</file>
+
+<file path=ppt/commentAuthors.xml><?xml version="1.0" encoding="utf-8"?>
+<p:cmAuthorLst xmlns:a="http://schemas.openxmlformats.org/drawingml/2006/main" xmlns:r="http://schemas.openxmlformats.org/officeDocument/2006/relationships" xmlns:p="http://schemas.openxmlformats.org/presentationml/2006/main">
+  <p:cmAuthor id="1" name="Jie" initials="J" lastIdx="2" clrIdx="0">
+    <p:extLst>
+      <p:ext uri="{19B8F6BF-5375-455C-9EA6-DF929625EA0E}">
+        <p15:presenceInfo xmlns:p15="http://schemas.microsoft.com/office/powerpoint/2012/main" userId="Jie" providerId="None"/>
+      </p:ext>
+    </p:extLst>
+  </p:cmAuthor>
+</p:cmAuthorLst>
+</file>
+
+<file path=ppt/comments/comment1.xml><?xml version="1.0" encoding="utf-8"?>
+<p:cmLst xmlns:a="http://schemas.openxmlformats.org/drawingml/2006/main" xmlns:r="http://schemas.openxmlformats.org/officeDocument/2006/relationships" xmlns:p="http://schemas.openxmlformats.org/presentationml/2006/main">
+  <p:cm authorId="1" dt="2020-04-09T10:13:17.038" idx="2">
+    <p:pos x="2312" y="3351"/>
+    <p:text>Ce serait pas mieux de mettre la version fréquence direct ou on met les deux version?</p:text>
+    <p:extLst>
+      <p:ext uri="{C676402C-5697-4E1C-873F-D02D1690AC5C}">
+        <p15:threadingInfo xmlns:p15="http://schemas.microsoft.com/office/powerpoint/2012/main" timeZoneBias="240"/>
+      </p:ext>
+    </p:extLst>
+  </p:cm>
+</p:cmLst>
 </file>
 
 <file path=ppt/slideLayouts/slideLayout1.xml><?xml version="1.0" encoding="utf-8"?>
@@ -964,7 +994,7 @@
             <a:fld id="{D57F1E4F-1CFF-5643-939E-217C01CDF565}" type="slidenum">
               <a:rPr lang="en-US" dirty="0"/>
               <a:pPr/>
-              <a:t>‹N°›</a:t>
+              <a:t>‹#›</a:t>
             </a:fld>
             <a:endParaRPr lang="en-US" dirty="0"/>
           </a:p>
@@ -1212,7 +1242,7 @@
             <a:fld id="{D57F1E4F-1CFF-5643-939E-217C01CDF565}" type="slidenum">
               <a:rPr lang="en-US" dirty="0"/>
               <a:pPr/>
-              <a:t>‹N°›</a:t>
+              <a:t>‹#›</a:t>
             </a:fld>
             <a:endParaRPr lang="en-US" dirty="0"/>
           </a:p>
@@ -1523,7 +1553,7 @@
             <a:fld id="{D57F1E4F-1CFF-5643-939E-217C01CDF565}" type="slidenum">
               <a:rPr lang="en-US" dirty="0"/>
               <a:pPr/>
-              <a:t>‹N°›</a:t>
+              <a:t>‹#›</a:t>
             </a:fld>
             <a:endParaRPr lang="en-US" dirty="0"/>
           </a:p>
@@ -1853,7 +1883,7 @@
             <a:fld id="{D57F1E4F-1CFF-5643-939E-217C01CDF565}" type="slidenum">
               <a:rPr lang="en-US" dirty="0"/>
               <a:pPr/>
-              <a:t>‹N°›</a:t>
+              <a:t>‹#›</a:t>
             </a:fld>
             <a:endParaRPr lang="en-US" dirty="0"/>
           </a:p>
@@ -2164,7 +2194,7 @@
             <a:fld id="{D57F1E4F-1CFF-5643-939E-217C01CDF565}" type="slidenum">
               <a:rPr lang="en-US" dirty="0"/>
               <a:pPr/>
-              <a:t>‹N°›</a:t>
+              <a:t>‹#›</a:t>
             </a:fld>
             <a:endParaRPr lang="en-US" dirty="0"/>
           </a:p>
@@ -2554,7 +2584,7 @@
             <a:fld id="{D57F1E4F-1CFF-5643-939E-217C01CDF565}" type="slidenum">
               <a:rPr lang="en-US" dirty="0"/>
               <a:pPr/>
-              <a:t>‹N°›</a:t>
+              <a:t>‹#›</a:t>
             </a:fld>
             <a:endParaRPr lang="en-US" dirty="0"/>
           </a:p>
@@ -2719,7 +2749,7 @@
           <a:p>
             <a:fld id="{89333C77-0158-454C-844F-B7AB9BD7DAD4}" type="slidenum">
               <a:rPr lang="en-US" dirty="0"/>
-              <a:t>‹N°›</a:t>
+              <a:t>‹#›</a:t>
             </a:fld>
             <a:endParaRPr lang="en-US" dirty="0"/>
           </a:p>
@@ -2896,7 +2926,7 @@
             <a:fld id="{D57F1E4F-1CFF-5643-939E-217C01CDF565}" type="slidenum">
               <a:rPr lang="en-US" dirty="0"/>
               <a:pPr/>
-              <a:t>‹N°›</a:t>
+              <a:t>‹#›</a:t>
             </a:fld>
             <a:endParaRPr lang="en-US" dirty="0"/>
           </a:p>
@@ -3061,7 +3091,7 @@
           <a:p>
             <a:fld id="{519954A3-9DFD-4C44-94BA-B95130A3BA1C}" type="slidenum">
               <a:rPr lang="en-US" dirty="0"/>
-              <a:t>‹N°›</a:t>
+              <a:t>‹#›</a:t>
             </a:fld>
             <a:endParaRPr lang="en-US" dirty="0"/>
           </a:p>
@@ -3305,7 +3335,7 @@
             <a:fld id="{D57F1E4F-1CFF-5643-939E-217C01CDF565}" type="slidenum">
               <a:rPr lang="en-US" dirty="0"/>
               <a:pPr/>
-              <a:t>‹N°›</a:t>
+              <a:t>‹#›</a:t>
             </a:fld>
             <a:endParaRPr lang="en-US" dirty="0"/>
           </a:p>
@@ -3532,7 +3562,7 @@
           <a:p>
             <a:fld id="{519954A3-9DFD-4C44-94BA-B95130A3BA1C}" type="slidenum">
               <a:rPr lang="en-US" dirty="0"/>
-              <a:t>‹N°›</a:t>
+              <a:t>‹#›</a:t>
             </a:fld>
             <a:endParaRPr lang="en-US" dirty="0"/>
           </a:p>
@@ -3903,7 +3933,7 @@
             <a:fld id="{D57F1E4F-1CFF-5643-939E-217C01CDF565}" type="slidenum">
               <a:rPr lang="en-US" dirty="0"/>
               <a:pPr/>
-              <a:t>‹N°›</a:t>
+              <a:t>‹#›</a:t>
             </a:fld>
             <a:endParaRPr lang="en-US" dirty="0"/>
           </a:p>
@@ -4023,7 +4053,7 @@
             <a:fld id="{D57F1E4F-1CFF-5643-939E-217C01CDF565}" type="slidenum">
               <a:rPr lang="en-US" dirty="0"/>
               <a:pPr/>
-              <a:t>‹N°›</a:t>
+              <a:t>‹#›</a:t>
             </a:fld>
             <a:endParaRPr lang="en-US" dirty="0"/>
           </a:p>
@@ -4115,7 +4145,7 @@
             <a:fld id="{D57F1E4F-1CFF-5643-939E-217C01CDF565}" type="slidenum">
               <a:rPr lang="en-US" dirty="0"/>
               <a:pPr/>
-              <a:t>‹N°›</a:t>
+              <a:t>‹#›</a:t>
             </a:fld>
             <a:endParaRPr lang="en-US" dirty="0"/>
           </a:p>
@@ -4365,7 +4395,7 @@
           <a:p>
             <a:fld id="{519954A3-9DFD-4C44-94BA-B95130A3BA1C}" type="slidenum">
               <a:rPr lang="en-US" dirty="0"/>
-              <a:t>‹N°›</a:t>
+              <a:t>‹#›</a:t>
             </a:fld>
             <a:endParaRPr lang="en-US" dirty="0"/>
           </a:p>
@@ -4601,7 +4631,7 @@
             <a:fld id="{D57F1E4F-1CFF-5643-939E-217C01CDF565}" type="slidenum">
               <a:rPr lang="en-US" dirty="0"/>
               <a:pPr/>
-              <a:t>‹N°›</a:t>
+              <a:t>‹#›</a:t>
             </a:fld>
             <a:endParaRPr lang="en-US" dirty="0"/>
           </a:p>
@@ -5400,7 +5430,7 @@
             <a:fld id="{D57F1E4F-1CFF-5643-939E-217C01CDF565}" type="slidenum">
               <a:rPr lang="en-US" dirty="0"/>
               <a:pPr/>
-              <a:t>‹N°›</a:t>
+              <a:t>‹#›</a:t>
             </a:fld>
             <a:endParaRPr lang="en-US" dirty="0"/>
           </a:p>
@@ -6363,50 +6393,45 @@
                   <a:srgbClr val="286D9F"/>
                 </a:solidFill>
               </a:rPr>
-              <a:t>Défis surmontés</a:t>
+              <a:t>Formulation champ total/ champ diffus</a:t>
             </a:r>
           </a:p>
         </p:txBody>
       </p:sp>
-      <p:sp>
-        <p:nvSpPr>
-          <p:cNvPr id="3" name="Rectangle 2">
+      <p:pic>
+        <p:nvPicPr>
+          <p:cNvPr id="4" name="Picture 3">
             <a:extLst>
               <a:ext uri="{FF2B5EF4-FFF2-40B4-BE49-F238E27FC236}">
-                <a16:creationId xmlns:a16="http://schemas.microsoft.com/office/drawing/2014/main" id="{BA0A46BD-0FD2-481A-AB72-F6E2A27E0618}"/>
+                <a16:creationId xmlns:a16="http://schemas.microsoft.com/office/drawing/2014/main" id="{DDC48D94-9EA7-4219-9F76-82E9ECE3F114}"/>
               </a:ext>
             </a:extLst>
           </p:cNvPr>
-          <p:cNvSpPr/>
+          <p:cNvPicPr>
+            <a:picLocks noChangeAspect="1"/>
+          </p:cNvPicPr>
           <p:nvPr/>
-        </p:nvSpPr>
+        </p:nvPicPr>
+        <p:blipFill>
+          <a:blip r:embed="rId2"/>
+          <a:stretch>
+            <a:fillRect/>
+          </a:stretch>
+        </p:blipFill>
         <p:spPr>
           <a:xfrm>
-            <a:off x="2276213" y="2908612"/>
-            <a:ext cx="6096000" cy="646331"/>
+            <a:off x="1209675" y="1771650"/>
+            <a:ext cx="9772650" cy="3314700"/>
           </a:xfrm>
           <a:prstGeom prst="rect">
             <a:avLst/>
           </a:prstGeom>
         </p:spPr>
-        <p:txBody>
-          <a:bodyPr>
-            <a:spAutoFit/>
-          </a:bodyPr>
-          <a:lstStyle/>
-          <a:p>
-            <a:r>
-              <a:rPr lang="fr-FR" dirty="0"/>
-              <a:t>Défis d’implémentation de l’algorithme et solutions utilisées pour surmonter ces défis</a:t>
-            </a:r>
-            <a:endParaRPr lang="fr-CA" dirty="0"/>
-          </a:p>
-        </p:txBody>
-      </p:sp>
+      </p:pic>
     </p:spTree>
     <p:extLst>
       <p:ext uri="{BB962C8B-B14F-4D97-AF65-F5344CB8AC3E}">
-        <p14:creationId xmlns:p14="http://schemas.microsoft.com/office/powerpoint/2010/main" val="2366093840"/>
+        <p14:creationId xmlns:p14="http://schemas.microsoft.com/office/powerpoint/2010/main" val="439228046"/>
       </p:ext>
     </p:extLst>
   </p:cSld>
@@ -6537,7 +6562,7 @@
                   <a:srgbClr val="286D9F"/>
                 </a:solidFill>
               </a:rPr>
-              <a:t>Utilisation de la mémoire</a:t>
+              <a:t>Paramètres de simulation</a:t>
             </a:r>
           </a:p>
         </p:txBody>
@@ -6571,7 +6596,7 @@
           <a:p>
             <a:r>
               <a:rPr lang="fr-FR" dirty="0"/>
-              <a:t>Comportement et limites de votre code en temps et en mémoire</a:t>
+              <a:t>Paramètres de l’algorithme (ex : pas de discrétisation, critère de convergence, etc.)</a:t>
             </a:r>
             <a:endParaRPr lang="fr-CA" dirty="0"/>
           </a:p>
@@ -6580,7 +6605,7 @@
     </p:spTree>
     <p:extLst>
       <p:ext uri="{BB962C8B-B14F-4D97-AF65-F5344CB8AC3E}">
-        <p14:creationId xmlns:p14="http://schemas.microsoft.com/office/powerpoint/2010/main" val="69171058"/>
+        <p14:creationId xmlns:p14="http://schemas.microsoft.com/office/powerpoint/2010/main" val="3922770649"/>
       </p:ext>
     </p:extLst>
   </p:cSld>
@@ -6711,6 +6736,354 @@
                   <a:srgbClr val="286D9F"/>
                 </a:solidFill>
               </a:rPr>
+              <a:t>Défis surmontés</a:t>
+            </a:r>
+          </a:p>
+        </p:txBody>
+      </p:sp>
+      <p:sp>
+        <p:nvSpPr>
+          <p:cNvPr id="3" name="Rectangle 2">
+            <a:extLst>
+              <a:ext uri="{FF2B5EF4-FFF2-40B4-BE49-F238E27FC236}">
+                <a16:creationId xmlns:a16="http://schemas.microsoft.com/office/drawing/2014/main" id="{BA0A46BD-0FD2-481A-AB72-F6E2A27E0618}"/>
+              </a:ext>
+            </a:extLst>
+          </p:cNvPr>
+          <p:cNvSpPr/>
+          <p:nvPr/>
+        </p:nvSpPr>
+        <p:spPr>
+          <a:xfrm>
+            <a:off x="2276213" y="2908612"/>
+            <a:ext cx="6096000" cy="646331"/>
+          </a:xfrm>
+          <a:prstGeom prst="rect">
+            <a:avLst/>
+          </a:prstGeom>
+        </p:spPr>
+        <p:txBody>
+          <a:bodyPr>
+            <a:spAutoFit/>
+          </a:bodyPr>
+          <a:lstStyle/>
+          <a:p>
+            <a:r>
+              <a:rPr lang="fr-FR" dirty="0"/>
+              <a:t>Défis d’implémentation de l’algorithme et solutions utilisées pour surmonter ces défis</a:t>
+            </a:r>
+            <a:endParaRPr lang="fr-CA" dirty="0"/>
+          </a:p>
+        </p:txBody>
+      </p:sp>
+    </p:spTree>
+    <p:extLst>
+      <p:ext uri="{BB962C8B-B14F-4D97-AF65-F5344CB8AC3E}">
+        <p14:creationId xmlns:p14="http://schemas.microsoft.com/office/powerpoint/2010/main" val="2366093840"/>
+      </p:ext>
+    </p:extLst>
+  </p:cSld>
+  <p:clrMapOvr>
+    <a:masterClrMapping/>
+  </p:clrMapOvr>
+</p:sld>
+</file>
+
+<file path=ppt/slides/slide13.xml><?xml version="1.0" encoding="utf-8"?>
+<p:sld xmlns:a="http://schemas.openxmlformats.org/drawingml/2006/main" xmlns:r="http://schemas.openxmlformats.org/officeDocument/2006/relationships" xmlns:p="http://schemas.openxmlformats.org/presentationml/2006/main">
+  <p:cSld>
+    <p:spTree>
+      <p:nvGrpSpPr>
+        <p:cNvPr id="1" name=""/>
+        <p:cNvGrpSpPr/>
+        <p:nvPr/>
+      </p:nvGrpSpPr>
+      <p:grpSpPr>
+        <a:xfrm>
+          <a:off x="0" y="0"/>
+          <a:ext cx="0" cy="0"/>
+          <a:chOff x="0" y="0"/>
+          <a:chExt cx="0" cy="0"/>
+        </a:xfrm>
+      </p:grpSpPr>
+      <p:sp>
+        <p:nvSpPr>
+          <p:cNvPr id="2" name="Titre 1">
+            <a:extLst>
+              <a:ext uri="{FF2B5EF4-FFF2-40B4-BE49-F238E27FC236}">
+                <a16:creationId xmlns:a16="http://schemas.microsoft.com/office/drawing/2014/main" id="{03EE799C-7398-441E-956D-60778EB6ADFB}"/>
+              </a:ext>
+            </a:extLst>
+          </p:cNvPr>
+          <p:cNvSpPr txBox="1">
+            <a:spLocks/>
+          </p:cNvSpPr>
+          <p:nvPr/>
+        </p:nvSpPr>
+        <p:spPr>
+          <a:xfrm>
+            <a:off x="455643" y="510175"/>
+            <a:ext cx="9015528" cy="739786"/>
+          </a:xfrm>
+          <a:prstGeom prst="rect">
+            <a:avLst/>
+          </a:prstGeom>
+        </p:spPr>
+        <p:txBody>
+          <a:bodyPr/>
+          <a:lstStyle>
+            <a:lvl1pPr algn="l" defTabSz="457200" rtl="0" eaLnBrk="1" latinLnBrk="0" hangingPunct="1">
+              <a:spcBef>
+                <a:spcPct val="0"/>
+              </a:spcBef>
+              <a:buNone/>
+              <a:defRPr sz="3600" kern="1200">
+                <a:solidFill>
+                  <a:schemeClr val="accent1"/>
+                </a:solidFill>
+                <a:latin typeface="+mj-lt"/>
+                <a:ea typeface="+mj-ea"/>
+                <a:cs typeface="+mj-cs"/>
+              </a:defRPr>
+            </a:lvl1pPr>
+            <a:lvl2pPr eaLnBrk="1" hangingPunct="1">
+              <a:defRPr>
+                <a:solidFill>
+                  <a:schemeClr val="tx2"/>
+                </a:solidFill>
+              </a:defRPr>
+            </a:lvl2pPr>
+            <a:lvl3pPr eaLnBrk="1" hangingPunct="1">
+              <a:defRPr>
+                <a:solidFill>
+                  <a:schemeClr val="tx2"/>
+                </a:solidFill>
+              </a:defRPr>
+            </a:lvl3pPr>
+            <a:lvl4pPr eaLnBrk="1" hangingPunct="1">
+              <a:defRPr>
+                <a:solidFill>
+                  <a:schemeClr val="tx2"/>
+                </a:solidFill>
+              </a:defRPr>
+            </a:lvl4pPr>
+            <a:lvl5pPr eaLnBrk="1" hangingPunct="1">
+              <a:defRPr>
+                <a:solidFill>
+                  <a:schemeClr val="tx2"/>
+                </a:solidFill>
+              </a:defRPr>
+            </a:lvl5pPr>
+            <a:lvl6pPr eaLnBrk="1" hangingPunct="1">
+              <a:defRPr>
+                <a:solidFill>
+                  <a:schemeClr val="tx2"/>
+                </a:solidFill>
+              </a:defRPr>
+            </a:lvl6pPr>
+            <a:lvl7pPr eaLnBrk="1" hangingPunct="1">
+              <a:defRPr>
+                <a:solidFill>
+                  <a:schemeClr val="tx2"/>
+                </a:solidFill>
+              </a:defRPr>
+            </a:lvl7pPr>
+            <a:lvl8pPr eaLnBrk="1" hangingPunct="1">
+              <a:defRPr>
+                <a:solidFill>
+                  <a:schemeClr val="tx2"/>
+                </a:solidFill>
+              </a:defRPr>
+            </a:lvl8pPr>
+            <a:lvl9pPr eaLnBrk="1" hangingPunct="1">
+              <a:defRPr>
+                <a:solidFill>
+                  <a:schemeClr val="tx2"/>
+                </a:solidFill>
+              </a:defRPr>
+            </a:lvl9pPr>
+          </a:lstStyle>
+          <a:p>
+            <a:r>
+              <a:rPr lang="fr-CA" dirty="0">
+                <a:solidFill>
+                  <a:srgbClr val="286D9F"/>
+                </a:solidFill>
+              </a:rPr>
+              <a:t>Utilisation de la mémoire</a:t>
+            </a:r>
+          </a:p>
+        </p:txBody>
+      </p:sp>
+      <p:sp>
+        <p:nvSpPr>
+          <p:cNvPr id="3" name="Rectangle 2">
+            <a:extLst>
+              <a:ext uri="{FF2B5EF4-FFF2-40B4-BE49-F238E27FC236}">
+                <a16:creationId xmlns:a16="http://schemas.microsoft.com/office/drawing/2014/main" id="{BA0A46BD-0FD2-481A-AB72-F6E2A27E0618}"/>
+              </a:ext>
+            </a:extLst>
+          </p:cNvPr>
+          <p:cNvSpPr/>
+          <p:nvPr/>
+        </p:nvSpPr>
+        <p:spPr>
+          <a:xfrm>
+            <a:off x="2276213" y="2908612"/>
+            <a:ext cx="6096000" cy="646331"/>
+          </a:xfrm>
+          <a:prstGeom prst="rect">
+            <a:avLst/>
+          </a:prstGeom>
+        </p:spPr>
+        <p:txBody>
+          <a:bodyPr>
+            <a:spAutoFit/>
+          </a:bodyPr>
+          <a:lstStyle/>
+          <a:p>
+            <a:r>
+              <a:rPr lang="fr-FR" dirty="0"/>
+              <a:t>Comportement et limites de votre code en temps et en mémoire</a:t>
+            </a:r>
+            <a:endParaRPr lang="fr-CA" dirty="0"/>
+          </a:p>
+        </p:txBody>
+      </p:sp>
+    </p:spTree>
+    <p:extLst>
+      <p:ext uri="{BB962C8B-B14F-4D97-AF65-F5344CB8AC3E}">
+        <p14:creationId xmlns:p14="http://schemas.microsoft.com/office/powerpoint/2010/main" val="69171058"/>
+      </p:ext>
+    </p:extLst>
+  </p:cSld>
+  <p:clrMapOvr>
+    <a:masterClrMapping/>
+  </p:clrMapOvr>
+</p:sld>
+</file>
+
+<file path=ppt/slides/slide14.xml><?xml version="1.0" encoding="utf-8"?>
+<p:sld xmlns:a="http://schemas.openxmlformats.org/drawingml/2006/main" xmlns:r="http://schemas.openxmlformats.org/officeDocument/2006/relationships" xmlns:p="http://schemas.openxmlformats.org/presentationml/2006/main">
+  <p:cSld>
+    <p:spTree>
+      <p:nvGrpSpPr>
+        <p:cNvPr id="1" name=""/>
+        <p:cNvGrpSpPr/>
+        <p:nvPr/>
+      </p:nvGrpSpPr>
+      <p:grpSpPr>
+        <a:xfrm>
+          <a:off x="0" y="0"/>
+          <a:ext cx="0" cy="0"/>
+          <a:chOff x="0" y="0"/>
+          <a:chExt cx="0" cy="0"/>
+        </a:xfrm>
+      </p:grpSpPr>
+      <p:sp>
+        <p:nvSpPr>
+          <p:cNvPr id="2" name="Titre 1">
+            <a:extLst>
+              <a:ext uri="{FF2B5EF4-FFF2-40B4-BE49-F238E27FC236}">
+                <a16:creationId xmlns:a16="http://schemas.microsoft.com/office/drawing/2014/main" id="{03EE799C-7398-441E-956D-60778EB6ADFB}"/>
+              </a:ext>
+            </a:extLst>
+          </p:cNvPr>
+          <p:cNvSpPr txBox="1">
+            <a:spLocks/>
+          </p:cNvSpPr>
+          <p:nvPr/>
+        </p:nvSpPr>
+        <p:spPr>
+          <a:xfrm>
+            <a:off x="455643" y="510175"/>
+            <a:ext cx="9015528" cy="739786"/>
+          </a:xfrm>
+          <a:prstGeom prst="rect">
+            <a:avLst/>
+          </a:prstGeom>
+        </p:spPr>
+        <p:txBody>
+          <a:bodyPr/>
+          <a:lstStyle>
+            <a:lvl1pPr algn="l" defTabSz="457200" rtl="0" eaLnBrk="1" latinLnBrk="0" hangingPunct="1">
+              <a:spcBef>
+                <a:spcPct val="0"/>
+              </a:spcBef>
+              <a:buNone/>
+              <a:defRPr sz="3600" kern="1200">
+                <a:solidFill>
+                  <a:schemeClr val="accent1"/>
+                </a:solidFill>
+                <a:latin typeface="+mj-lt"/>
+                <a:ea typeface="+mj-ea"/>
+                <a:cs typeface="+mj-cs"/>
+              </a:defRPr>
+            </a:lvl1pPr>
+            <a:lvl2pPr eaLnBrk="1" hangingPunct="1">
+              <a:defRPr>
+                <a:solidFill>
+                  <a:schemeClr val="tx2"/>
+                </a:solidFill>
+              </a:defRPr>
+            </a:lvl2pPr>
+            <a:lvl3pPr eaLnBrk="1" hangingPunct="1">
+              <a:defRPr>
+                <a:solidFill>
+                  <a:schemeClr val="tx2"/>
+                </a:solidFill>
+              </a:defRPr>
+            </a:lvl3pPr>
+            <a:lvl4pPr eaLnBrk="1" hangingPunct="1">
+              <a:defRPr>
+                <a:solidFill>
+                  <a:schemeClr val="tx2"/>
+                </a:solidFill>
+              </a:defRPr>
+            </a:lvl4pPr>
+            <a:lvl5pPr eaLnBrk="1" hangingPunct="1">
+              <a:defRPr>
+                <a:solidFill>
+                  <a:schemeClr val="tx2"/>
+                </a:solidFill>
+              </a:defRPr>
+            </a:lvl5pPr>
+            <a:lvl6pPr eaLnBrk="1" hangingPunct="1">
+              <a:defRPr>
+                <a:solidFill>
+                  <a:schemeClr val="tx2"/>
+                </a:solidFill>
+              </a:defRPr>
+            </a:lvl6pPr>
+            <a:lvl7pPr eaLnBrk="1" hangingPunct="1">
+              <a:defRPr>
+                <a:solidFill>
+                  <a:schemeClr val="tx2"/>
+                </a:solidFill>
+              </a:defRPr>
+            </a:lvl7pPr>
+            <a:lvl8pPr eaLnBrk="1" hangingPunct="1">
+              <a:defRPr>
+                <a:solidFill>
+                  <a:schemeClr val="tx2"/>
+                </a:solidFill>
+              </a:defRPr>
+            </a:lvl8pPr>
+            <a:lvl9pPr eaLnBrk="1" hangingPunct="1">
+              <a:defRPr>
+                <a:solidFill>
+                  <a:schemeClr val="tx2"/>
+                </a:solidFill>
+              </a:defRPr>
+            </a:lvl9pPr>
+          </a:lstStyle>
+          <a:p>
+            <a:r>
+              <a:rPr lang="fr-CA" dirty="0">
+                <a:solidFill>
+                  <a:srgbClr val="286D9F"/>
+                </a:solidFill>
+              </a:rPr>
               <a:t>Influence sur la performance</a:t>
             </a:r>
           </a:p>
@@ -6764,7 +7137,7 @@
 </p:sld>
 </file>
 
-<file path=ppt/slides/slide13.xml><?xml version="1.0" encoding="utf-8"?>
+<file path=ppt/slides/slide15.xml><?xml version="1.0" encoding="utf-8"?>
 <p:sld xmlns:a="http://schemas.openxmlformats.org/drawingml/2006/main" xmlns:r="http://schemas.openxmlformats.org/officeDocument/2006/relationships" xmlns:p="http://schemas.openxmlformats.org/presentationml/2006/main">
   <p:cSld>
     <p:spTree>
@@ -6938,7 +7311,7 @@
 </p:sld>
 </file>
 
-<file path=ppt/slides/slide14.xml><?xml version="1.0" encoding="utf-8"?>
+<file path=ppt/slides/slide16.xml><?xml version="1.0" encoding="utf-8"?>
 <p:sld xmlns:a="http://schemas.openxmlformats.org/drawingml/2006/main" xmlns:r="http://schemas.openxmlformats.org/officeDocument/2006/relationships" xmlns:p="http://schemas.openxmlformats.org/presentationml/2006/main">
   <p:cSld>
     <p:spTree>
@@ -7112,7 +7485,7 @@
 </p:sld>
 </file>
 
-<file path=ppt/slides/slide15.xml><?xml version="1.0" encoding="utf-8"?>
+<file path=ppt/slides/slide17.xml><?xml version="1.0" encoding="utf-8"?>
 <p:sld xmlns:a="http://schemas.openxmlformats.org/drawingml/2006/main" xmlns:r="http://schemas.openxmlformats.org/officeDocument/2006/relationships" xmlns:p="http://schemas.openxmlformats.org/presentationml/2006/main">
   <p:cSld>
     <p:spTree>
@@ -7286,7 +7659,7 @@
 </p:sld>
 </file>
 
-<file path=ppt/slides/slide16.xml><?xml version="1.0" encoding="utf-8"?>
+<file path=ppt/slides/slide18.xml><?xml version="1.0" encoding="utf-8"?>
 <p:sld xmlns:a="http://schemas.openxmlformats.org/drawingml/2006/main" xmlns:r="http://schemas.openxmlformats.org/officeDocument/2006/relationships" xmlns:p="http://schemas.openxmlformats.org/presentationml/2006/main">
   <p:cSld>
     <p:spTree>
@@ -7460,7 +7833,7 @@
 </p:sld>
 </file>
 
-<file path=ppt/slides/slide17.xml><?xml version="1.0" encoding="utf-8"?>
+<file path=ppt/slides/slide19.xml><?xml version="1.0" encoding="utf-8"?>
 <p:sld xmlns:a="http://schemas.openxmlformats.org/drawingml/2006/main" xmlns:r="http://schemas.openxmlformats.org/officeDocument/2006/relationships" xmlns:p="http://schemas.openxmlformats.org/presentationml/2006/main">
   <p:cSld>
     <p:spTree>
@@ -7625,253 +7998,6 @@
     <p:extLst>
       <p:ext uri="{BB962C8B-B14F-4D97-AF65-F5344CB8AC3E}">
         <p14:creationId xmlns:p14="http://schemas.microsoft.com/office/powerpoint/2010/main" val="4105811840"/>
-      </p:ext>
-    </p:extLst>
-  </p:cSld>
-  <p:clrMapOvr>
-    <a:masterClrMapping/>
-  </p:clrMapOvr>
-</p:sld>
-</file>
-
-<file path=ppt/slides/slide18.xml><?xml version="1.0" encoding="utf-8"?>
-<p:sld xmlns:a="http://schemas.openxmlformats.org/drawingml/2006/main" xmlns:r="http://schemas.openxmlformats.org/officeDocument/2006/relationships" xmlns:p="http://schemas.openxmlformats.org/presentationml/2006/main">
-  <p:cSld>
-    <p:spTree>
-      <p:nvGrpSpPr>
-        <p:cNvPr id="1" name=""/>
-        <p:cNvGrpSpPr/>
-        <p:nvPr/>
-      </p:nvGrpSpPr>
-      <p:grpSpPr>
-        <a:xfrm>
-          <a:off x="0" y="0"/>
-          <a:ext cx="0" cy="0"/>
-          <a:chOff x="0" y="0"/>
-          <a:chExt cx="0" cy="0"/>
-        </a:xfrm>
-      </p:grpSpPr>
-      <p:sp>
-        <p:nvSpPr>
-          <p:cNvPr id="2" name="Titre 1">
-            <a:extLst>
-              <a:ext uri="{FF2B5EF4-FFF2-40B4-BE49-F238E27FC236}">
-                <a16:creationId xmlns:a16="http://schemas.microsoft.com/office/drawing/2014/main" id="{03EE799C-7398-441E-956D-60778EB6ADFB}"/>
-              </a:ext>
-            </a:extLst>
-          </p:cNvPr>
-          <p:cNvSpPr txBox="1">
-            <a:spLocks/>
-          </p:cNvSpPr>
-          <p:nvPr/>
-        </p:nvSpPr>
-        <p:spPr>
-          <a:xfrm>
-            <a:off x="455643" y="510175"/>
-            <a:ext cx="3352959" cy="739786"/>
-          </a:xfrm>
-          <a:prstGeom prst="rect">
-            <a:avLst/>
-          </a:prstGeom>
-        </p:spPr>
-        <p:txBody>
-          <a:bodyPr/>
-          <a:lstStyle>
-            <a:lvl1pPr algn="l" defTabSz="457200" rtl="0" eaLnBrk="1" latinLnBrk="0" hangingPunct="1">
-              <a:spcBef>
-                <a:spcPct val="0"/>
-              </a:spcBef>
-              <a:buNone/>
-              <a:defRPr sz="3600" kern="1200">
-                <a:solidFill>
-                  <a:schemeClr val="accent1"/>
-                </a:solidFill>
-                <a:latin typeface="+mj-lt"/>
-                <a:ea typeface="+mj-ea"/>
-                <a:cs typeface="+mj-cs"/>
-              </a:defRPr>
-            </a:lvl1pPr>
-            <a:lvl2pPr eaLnBrk="1" hangingPunct="1">
-              <a:defRPr>
-                <a:solidFill>
-                  <a:schemeClr val="tx2"/>
-                </a:solidFill>
-              </a:defRPr>
-            </a:lvl2pPr>
-            <a:lvl3pPr eaLnBrk="1" hangingPunct="1">
-              <a:defRPr>
-                <a:solidFill>
-                  <a:schemeClr val="tx2"/>
-                </a:solidFill>
-              </a:defRPr>
-            </a:lvl3pPr>
-            <a:lvl4pPr eaLnBrk="1" hangingPunct="1">
-              <a:defRPr>
-                <a:solidFill>
-                  <a:schemeClr val="tx2"/>
-                </a:solidFill>
-              </a:defRPr>
-            </a:lvl4pPr>
-            <a:lvl5pPr eaLnBrk="1" hangingPunct="1">
-              <a:defRPr>
-                <a:solidFill>
-                  <a:schemeClr val="tx2"/>
-                </a:solidFill>
-              </a:defRPr>
-            </a:lvl5pPr>
-            <a:lvl6pPr eaLnBrk="1" hangingPunct="1">
-              <a:defRPr>
-                <a:solidFill>
-                  <a:schemeClr val="tx2"/>
-                </a:solidFill>
-              </a:defRPr>
-            </a:lvl6pPr>
-            <a:lvl7pPr eaLnBrk="1" hangingPunct="1">
-              <a:defRPr>
-                <a:solidFill>
-                  <a:schemeClr val="tx2"/>
-                </a:solidFill>
-              </a:defRPr>
-            </a:lvl7pPr>
-            <a:lvl8pPr eaLnBrk="1" hangingPunct="1">
-              <a:defRPr>
-                <a:solidFill>
-                  <a:schemeClr val="tx2"/>
-                </a:solidFill>
-              </a:defRPr>
-            </a:lvl8pPr>
-            <a:lvl9pPr eaLnBrk="1" hangingPunct="1">
-              <a:defRPr>
-                <a:solidFill>
-                  <a:schemeClr val="tx2"/>
-                </a:solidFill>
-              </a:defRPr>
-            </a:lvl9pPr>
-          </a:lstStyle>
-          <a:p>
-            <a:r>
-              <a:rPr lang="fr-CA" dirty="0">
-                <a:solidFill>
-                  <a:srgbClr val="286D9F"/>
-                </a:solidFill>
-              </a:rPr>
-              <a:t>Références</a:t>
-            </a:r>
-          </a:p>
-        </p:txBody>
-      </p:sp>
-      <p:sp>
-        <p:nvSpPr>
-          <p:cNvPr id="3" name="Rectangle 2">
-            <a:extLst>
-              <a:ext uri="{FF2B5EF4-FFF2-40B4-BE49-F238E27FC236}">
-                <a16:creationId xmlns:a16="http://schemas.microsoft.com/office/drawing/2014/main" id="{BA0A46BD-0FD2-481A-AB72-F6E2A27E0618}"/>
-              </a:ext>
-            </a:extLst>
-          </p:cNvPr>
-          <p:cNvSpPr/>
-          <p:nvPr/>
-        </p:nvSpPr>
-        <p:spPr>
-          <a:xfrm>
-            <a:off x="631970" y="1507650"/>
-            <a:ext cx="7127847" cy="1785104"/>
-          </a:xfrm>
-          <a:prstGeom prst="rect">
-            <a:avLst/>
-          </a:prstGeom>
-        </p:spPr>
-        <p:txBody>
-          <a:bodyPr wrap="square">
-            <a:spAutoFit/>
-          </a:bodyPr>
-          <a:lstStyle/>
-          <a:p>
-            <a:r>
-              <a:rPr lang="fr-FR" sz="1400" dirty="0"/>
-              <a:t>[1] P. Mathew, «</a:t>
-            </a:r>
-            <a:r>
-              <a:rPr lang="en-US" sz="1400" i="1" dirty="0"/>
-              <a:t>Application of SONAR in ships»</a:t>
-            </a:r>
-            <a:r>
-              <a:rPr lang="fr-FR" sz="1400" dirty="0"/>
-              <a:t>, </a:t>
-            </a:r>
-            <a:r>
-              <a:rPr lang="fr-FR" sz="1400" dirty="0" err="1"/>
-              <a:t>ResearchGate</a:t>
-            </a:r>
-            <a:r>
-              <a:rPr lang="fr-FR" sz="1400" dirty="0"/>
-              <a:t>, </a:t>
-            </a:r>
-            <a:r>
-              <a:rPr lang="fr-CA" sz="1400" dirty="0"/>
-              <a:t>https://www.researchgate.net/figure/Figure-Application-of-SONAR-in-ships_fig1_325895667 </a:t>
-            </a:r>
-            <a:r>
-              <a:rPr lang="fr-FR" sz="1400" dirty="0"/>
-              <a:t>[En ligne ; Page disponible le 8 avril 2020].</a:t>
-            </a:r>
-          </a:p>
-          <a:p>
-            <a:endParaRPr lang="fr-FR" sz="600" dirty="0"/>
-          </a:p>
-          <a:p>
-            <a:r>
-              <a:rPr lang="fr-FR" sz="1400" dirty="0"/>
-              <a:t>[2] </a:t>
-            </a:r>
-            <a:r>
-              <a:rPr lang="fr-FR" sz="1400" dirty="0" err="1"/>
-              <a:t>Elbit</a:t>
-            </a:r>
-            <a:r>
-              <a:rPr lang="fr-FR" sz="1400" dirty="0"/>
-              <a:t> </a:t>
-            </a:r>
-            <a:r>
-              <a:rPr lang="fr-FR" sz="1400" dirty="0" err="1"/>
-              <a:t>Systems</a:t>
-            </a:r>
-            <a:r>
-              <a:rPr lang="fr-FR" sz="1400" dirty="0"/>
-              <a:t>, «</a:t>
-            </a:r>
-            <a:r>
-              <a:rPr lang="fr-FR" sz="1400" i="1" dirty="0"/>
-              <a:t>C-BASS</a:t>
-            </a:r>
-            <a:r>
-              <a:rPr lang="fr-FR" sz="1400" dirty="0"/>
-              <a:t>», Hull </a:t>
-            </a:r>
-            <a:r>
-              <a:rPr lang="fr-FR" sz="1400" dirty="0" err="1"/>
-              <a:t>Mounted</a:t>
-            </a:r>
-            <a:r>
-              <a:rPr lang="fr-FR" sz="1400" dirty="0"/>
-              <a:t> Sonar, https://www.elbitsystems-uk.com/what-we-do/naval/underwater-warfare/sonar-systems [En ligne ; Page disponible le 8 avril 2020].</a:t>
-            </a:r>
-          </a:p>
-          <a:p>
-            <a:endParaRPr lang="fr-FR" sz="600" dirty="0"/>
-          </a:p>
-          <a:p>
-            <a:r>
-              <a:rPr lang="fr-CA" sz="1400" dirty="0"/>
-              <a:t>[3] </a:t>
-            </a:r>
-          </a:p>
-        </p:txBody>
-      </p:sp>
-    </p:spTree>
-    <p:extLst>
-      <p:ext uri="{BB962C8B-B14F-4D97-AF65-F5344CB8AC3E}">
-        <p14:creationId xmlns:p14="http://schemas.microsoft.com/office/powerpoint/2010/main" val="335560268"/>
       </p:ext>
     </p:extLst>
   </p:cSld>
@@ -8281,6 +8407,253 @@
     <p:extLst>
       <p:ext uri="{BB962C8B-B14F-4D97-AF65-F5344CB8AC3E}">
         <p14:creationId xmlns:p14="http://schemas.microsoft.com/office/powerpoint/2010/main" val="1307310142"/>
+      </p:ext>
+    </p:extLst>
+  </p:cSld>
+  <p:clrMapOvr>
+    <a:masterClrMapping/>
+  </p:clrMapOvr>
+</p:sld>
+</file>
+
+<file path=ppt/slides/slide20.xml><?xml version="1.0" encoding="utf-8"?>
+<p:sld xmlns:a="http://schemas.openxmlformats.org/drawingml/2006/main" xmlns:r="http://schemas.openxmlformats.org/officeDocument/2006/relationships" xmlns:p="http://schemas.openxmlformats.org/presentationml/2006/main">
+  <p:cSld>
+    <p:spTree>
+      <p:nvGrpSpPr>
+        <p:cNvPr id="1" name=""/>
+        <p:cNvGrpSpPr/>
+        <p:nvPr/>
+      </p:nvGrpSpPr>
+      <p:grpSpPr>
+        <a:xfrm>
+          <a:off x="0" y="0"/>
+          <a:ext cx="0" cy="0"/>
+          <a:chOff x="0" y="0"/>
+          <a:chExt cx="0" cy="0"/>
+        </a:xfrm>
+      </p:grpSpPr>
+      <p:sp>
+        <p:nvSpPr>
+          <p:cNvPr id="2" name="Titre 1">
+            <a:extLst>
+              <a:ext uri="{FF2B5EF4-FFF2-40B4-BE49-F238E27FC236}">
+                <a16:creationId xmlns:a16="http://schemas.microsoft.com/office/drawing/2014/main" id="{03EE799C-7398-441E-956D-60778EB6ADFB}"/>
+              </a:ext>
+            </a:extLst>
+          </p:cNvPr>
+          <p:cNvSpPr txBox="1">
+            <a:spLocks/>
+          </p:cNvSpPr>
+          <p:nvPr/>
+        </p:nvSpPr>
+        <p:spPr>
+          <a:xfrm>
+            <a:off x="455643" y="510175"/>
+            <a:ext cx="3352959" cy="739786"/>
+          </a:xfrm>
+          <a:prstGeom prst="rect">
+            <a:avLst/>
+          </a:prstGeom>
+        </p:spPr>
+        <p:txBody>
+          <a:bodyPr/>
+          <a:lstStyle>
+            <a:lvl1pPr algn="l" defTabSz="457200" rtl="0" eaLnBrk="1" latinLnBrk="0" hangingPunct="1">
+              <a:spcBef>
+                <a:spcPct val="0"/>
+              </a:spcBef>
+              <a:buNone/>
+              <a:defRPr sz="3600" kern="1200">
+                <a:solidFill>
+                  <a:schemeClr val="accent1"/>
+                </a:solidFill>
+                <a:latin typeface="+mj-lt"/>
+                <a:ea typeface="+mj-ea"/>
+                <a:cs typeface="+mj-cs"/>
+              </a:defRPr>
+            </a:lvl1pPr>
+            <a:lvl2pPr eaLnBrk="1" hangingPunct="1">
+              <a:defRPr>
+                <a:solidFill>
+                  <a:schemeClr val="tx2"/>
+                </a:solidFill>
+              </a:defRPr>
+            </a:lvl2pPr>
+            <a:lvl3pPr eaLnBrk="1" hangingPunct="1">
+              <a:defRPr>
+                <a:solidFill>
+                  <a:schemeClr val="tx2"/>
+                </a:solidFill>
+              </a:defRPr>
+            </a:lvl3pPr>
+            <a:lvl4pPr eaLnBrk="1" hangingPunct="1">
+              <a:defRPr>
+                <a:solidFill>
+                  <a:schemeClr val="tx2"/>
+                </a:solidFill>
+              </a:defRPr>
+            </a:lvl4pPr>
+            <a:lvl5pPr eaLnBrk="1" hangingPunct="1">
+              <a:defRPr>
+                <a:solidFill>
+                  <a:schemeClr val="tx2"/>
+                </a:solidFill>
+              </a:defRPr>
+            </a:lvl5pPr>
+            <a:lvl6pPr eaLnBrk="1" hangingPunct="1">
+              <a:defRPr>
+                <a:solidFill>
+                  <a:schemeClr val="tx2"/>
+                </a:solidFill>
+              </a:defRPr>
+            </a:lvl6pPr>
+            <a:lvl7pPr eaLnBrk="1" hangingPunct="1">
+              <a:defRPr>
+                <a:solidFill>
+                  <a:schemeClr val="tx2"/>
+                </a:solidFill>
+              </a:defRPr>
+            </a:lvl7pPr>
+            <a:lvl8pPr eaLnBrk="1" hangingPunct="1">
+              <a:defRPr>
+                <a:solidFill>
+                  <a:schemeClr val="tx2"/>
+                </a:solidFill>
+              </a:defRPr>
+            </a:lvl8pPr>
+            <a:lvl9pPr eaLnBrk="1" hangingPunct="1">
+              <a:defRPr>
+                <a:solidFill>
+                  <a:schemeClr val="tx2"/>
+                </a:solidFill>
+              </a:defRPr>
+            </a:lvl9pPr>
+          </a:lstStyle>
+          <a:p>
+            <a:r>
+              <a:rPr lang="fr-CA" dirty="0">
+                <a:solidFill>
+                  <a:srgbClr val="286D9F"/>
+                </a:solidFill>
+              </a:rPr>
+              <a:t>Références</a:t>
+            </a:r>
+          </a:p>
+        </p:txBody>
+      </p:sp>
+      <p:sp>
+        <p:nvSpPr>
+          <p:cNvPr id="3" name="Rectangle 2">
+            <a:extLst>
+              <a:ext uri="{FF2B5EF4-FFF2-40B4-BE49-F238E27FC236}">
+                <a16:creationId xmlns:a16="http://schemas.microsoft.com/office/drawing/2014/main" id="{BA0A46BD-0FD2-481A-AB72-F6E2A27E0618}"/>
+              </a:ext>
+            </a:extLst>
+          </p:cNvPr>
+          <p:cNvSpPr/>
+          <p:nvPr/>
+        </p:nvSpPr>
+        <p:spPr>
+          <a:xfrm>
+            <a:off x="631970" y="1507650"/>
+            <a:ext cx="7127847" cy="1785104"/>
+          </a:xfrm>
+          <a:prstGeom prst="rect">
+            <a:avLst/>
+          </a:prstGeom>
+        </p:spPr>
+        <p:txBody>
+          <a:bodyPr wrap="square">
+            <a:spAutoFit/>
+          </a:bodyPr>
+          <a:lstStyle/>
+          <a:p>
+            <a:r>
+              <a:rPr lang="fr-FR" sz="1400" dirty="0"/>
+              <a:t>[1] P. Mathew, «</a:t>
+            </a:r>
+            <a:r>
+              <a:rPr lang="en-US" sz="1400" i="1" dirty="0"/>
+              <a:t>Application of SONAR in ships»</a:t>
+            </a:r>
+            <a:r>
+              <a:rPr lang="fr-FR" sz="1400" dirty="0"/>
+              <a:t>, </a:t>
+            </a:r>
+            <a:r>
+              <a:rPr lang="fr-FR" sz="1400" dirty="0" err="1"/>
+              <a:t>ResearchGate</a:t>
+            </a:r>
+            <a:r>
+              <a:rPr lang="fr-FR" sz="1400" dirty="0"/>
+              <a:t>, </a:t>
+            </a:r>
+            <a:r>
+              <a:rPr lang="fr-CA" sz="1400" dirty="0"/>
+              <a:t>https://www.researchgate.net/figure/Figure-Application-of-SONAR-in-ships_fig1_325895667 </a:t>
+            </a:r>
+            <a:r>
+              <a:rPr lang="fr-FR" sz="1400" dirty="0"/>
+              <a:t>[En ligne ; Page disponible le 8 avril 2020].</a:t>
+            </a:r>
+          </a:p>
+          <a:p>
+            <a:endParaRPr lang="fr-FR" sz="600" dirty="0"/>
+          </a:p>
+          <a:p>
+            <a:r>
+              <a:rPr lang="fr-FR" sz="1400" dirty="0"/>
+              <a:t>[2] </a:t>
+            </a:r>
+            <a:r>
+              <a:rPr lang="fr-FR" sz="1400" dirty="0" err="1"/>
+              <a:t>Elbit</a:t>
+            </a:r>
+            <a:r>
+              <a:rPr lang="fr-FR" sz="1400" dirty="0"/>
+              <a:t> </a:t>
+            </a:r>
+            <a:r>
+              <a:rPr lang="fr-FR" sz="1400" dirty="0" err="1"/>
+              <a:t>Systems</a:t>
+            </a:r>
+            <a:r>
+              <a:rPr lang="fr-FR" sz="1400" dirty="0"/>
+              <a:t>, «</a:t>
+            </a:r>
+            <a:r>
+              <a:rPr lang="fr-FR" sz="1400" i="1" dirty="0"/>
+              <a:t>C-BASS</a:t>
+            </a:r>
+            <a:r>
+              <a:rPr lang="fr-FR" sz="1400" dirty="0"/>
+              <a:t>», Hull </a:t>
+            </a:r>
+            <a:r>
+              <a:rPr lang="fr-FR" sz="1400" dirty="0" err="1"/>
+              <a:t>Mounted</a:t>
+            </a:r>
+            <a:r>
+              <a:rPr lang="fr-FR" sz="1400" dirty="0"/>
+              <a:t> Sonar, https://www.elbitsystems-uk.com/what-we-do/naval/underwater-warfare/sonar-systems [En ligne ; Page disponible le 8 avril 2020].</a:t>
+            </a:r>
+          </a:p>
+          <a:p>
+            <a:endParaRPr lang="fr-FR" sz="600" dirty="0"/>
+          </a:p>
+          <a:p>
+            <a:r>
+              <a:rPr lang="fr-CA" sz="1400" dirty="0"/>
+              <a:t>[3] </a:t>
+            </a:r>
+          </a:p>
+        </p:txBody>
+      </p:sp>
+    </p:spTree>
+    <p:extLst>
+      <p:ext uri="{BB962C8B-B14F-4D97-AF65-F5344CB8AC3E}">
+        <p14:creationId xmlns:p14="http://schemas.microsoft.com/office/powerpoint/2010/main" val="335560268"/>
       </p:ext>
     </p:extLst>
   </p:cSld>
@@ -13431,8 +13804,8 @@
             <a:chExt cx="4856765" cy="917046"/>
           </a:xfrm>
         </p:grpSpPr>
-        <mc:AlternateContent xmlns:mc="http://schemas.openxmlformats.org/markup-compatibility/2006">
-          <mc:Choice xmlns:a14="http://schemas.microsoft.com/office/drawing/2010/main" Requires="a14">
+        <mc:AlternateContent xmlns:mc="http://schemas.openxmlformats.org/markup-compatibility/2006" xmlns:a14="http://schemas.microsoft.com/office/drawing/2010/main">
+          <mc:Choice Requires="a14">
             <p:sp>
               <p:nvSpPr>
                 <p:cNvPr id="4" name="ZoneTexte 3">
@@ -13461,6 +13834,7 @@
                 </a:bodyPr>
                 <a:lstStyle/>
                 <a:p>
+                  <a:pPr/>
                   <a14:m>
                     <m:oMathPara xmlns:m="http://schemas.openxmlformats.org/officeDocument/2006/math">
                       <m:oMathParaPr>
@@ -13937,7 +14311,7 @@
               </p:txBody>
             </p:sp>
           </mc:Choice>
-          <mc:Fallback>
+          <mc:Fallback xmlns="">
             <p:sp>
               <p:nvSpPr>
                 <p:cNvPr id="4" name="ZoneTexte 3">
@@ -14174,8 +14548,8 @@
             <a:chExt cx="3214598" cy="733534"/>
           </a:xfrm>
         </p:grpSpPr>
-        <mc:AlternateContent xmlns:mc="http://schemas.openxmlformats.org/markup-compatibility/2006">
-          <mc:Choice xmlns:a14="http://schemas.microsoft.com/office/drawing/2010/main" Requires="a14">
+        <mc:AlternateContent xmlns:mc="http://schemas.openxmlformats.org/markup-compatibility/2006" xmlns:a14="http://schemas.microsoft.com/office/drawing/2010/main">
+          <mc:Choice Requires="a14">
             <p:sp>
               <p:nvSpPr>
                 <p:cNvPr id="10" name="ZoneTexte 9">
@@ -14204,6 +14578,7 @@
                 </a:bodyPr>
                 <a:lstStyle/>
                 <a:p>
+                  <a:pPr/>
                   <a14:m>
                     <m:oMathPara xmlns:m="http://schemas.openxmlformats.org/officeDocument/2006/math">
                       <m:oMathParaPr>
@@ -14461,7 +14836,7 @@
               </p:txBody>
             </p:sp>
           </mc:Choice>
-          <mc:Fallback>
+          <mc:Fallback xmlns="">
             <p:sp>
               <p:nvSpPr>
                 <p:cNvPr id="10" name="ZoneTexte 9">
@@ -14565,8 +14940,8 @@
             <a:chExt cx="4454219" cy="369332"/>
           </a:xfrm>
         </p:grpSpPr>
-        <mc:AlternateContent xmlns:mc="http://schemas.openxmlformats.org/markup-compatibility/2006">
-          <mc:Choice xmlns:a14="http://schemas.microsoft.com/office/drawing/2010/main" Requires="a14">
+        <mc:AlternateContent xmlns:mc="http://schemas.openxmlformats.org/markup-compatibility/2006" xmlns:a14="http://schemas.microsoft.com/office/drawing/2010/main">
+          <mc:Choice Requires="a14">
             <p:sp>
               <p:nvSpPr>
                 <p:cNvPr id="12" name="ZoneTexte 11">
@@ -14595,6 +14970,7 @@
                 </a:bodyPr>
                 <a:lstStyle/>
                 <a:p>
+                  <a:pPr/>
                   <a14:m>
                     <m:oMathPara xmlns:m="http://schemas.openxmlformats.org/officeDocument/2006/math">
                       <m:oMathParaPr>
@@ -14932,7 +15308,7 @@
               </p:txBody>
             </p:sp>
           </mc:Choice>
-          <mc:Fallback>
+          <mc:Fallback xmlns="">
             <p:sp>
               <p:nvSpPr>
                 <p:cNvPr id="12" name="ZoneTexte 11">
@@ -15016,6 +15392,731 @@
           </p:txBody>
         </p:sp>
       </p:grpSp>
+      <mc:AlternateContent xmlns:mc="http://schemas.openxmlformats.org/markup-compatibility/2006">
+        <mc:Choice xmlns:a14="http://schemas.microsoft.com/office/drawing/2010/main" Requires="a14">
+          <p:sp>
+            <p:nvSpPr>
+              <p:cNvPr id="11" name="TextBox 10">
+                <a:extLst>
+                  <a:ext uri="{FF2B5EF4-FFF2-40B4-BE49-F238E27FC236}">
+                    <a16:creationId xmlns:a16="http://schemas.microsoft.com/office/drawing/2014/main" id="{003D2D0D-0D3C-475B-91BF-156AA8591FA5}"/>
+                  </a:ext>
+                </a:extLst>
+              </p:cNvPr>
+              <p:cNvSpPr txBox="1"/>
+              <p:nvPr/>
+            </p:nvSpPr>
+            <p:spPr>
+              <a:xfrm>
+                <a:off x="1799376" y="5988957"/>
+                <a:ext cx="4096571" cy="627929"/>
+              </a:xfrm>
+              <a:prstGeom prst="rect">
+                <a:avLst/>
+              </a:prstGeom>
+              <a:noFill/>
+            </p:spPr>
+            <p:txBody>
+              <a:bodyPr wrap="none" lIns="0" tIns="0" rIns="0" bIns="0" rtlCol="0">
+                <a:spAutoFit/>
+              </a:bodyPr>
+              <a:lstStyle/>
+              <a:p>
+                <a14:m>
+                  <m:oMathPara xmlns:m="http://schemas.openxmlformats.org/officeDocument/2006/math">
+                    <m:oMathParaPr>
+                      <m:jc m:val="centerGroup"/>
+                    </m:oMathParaPr>
+                    <m:oMath xmlns:m="http://schemas.openxmlformats.org/officeDocument/2006/math">
+                      <m:f>
+                        <m:fPr>
+                          <m:ctrlPr>
+                            <a:rPr lang="en-CA" b="0" i="1" smtClean="0">
+                              <a:latin typeface="Cambria Math" panose="02040503050406030204" pitchFamily="18" charset="0"/>
+                            </a:rPr>
+                          </m:ctrlPr>
+                        </m:fPr>
+                        <m:num>
+                          <m:r>
+                            <a:rPr lang="en-CA" b="0" i="1" smtClean="0">
+                              <a:latin typeface="Cambria Math" panose="02040503050406030204" pitchFamily="18" charset="0"/>
+                            </a:rPr>
+                            <m:t>1</m:t>
+                          </m:r>
+                        </m:num>
+                        <m:den>
+                          <m:sSub>
+                            <m:sSubPr>
+                              <m:ctrlPr>
+                                <a:rPr lang="en-CA" b="0" i="1" smtClean="0">
+                                  <a:latin typeface="Cambria Math" panose="02040503050406030204" pitchFamily="18" charset="0"/>
+                                </a:rPr>
+                              </m:ctrlPr>
+                            </m:sSubPr>
+                            <m:e>
+                              <m:r>
+                                <a:rPr lang="en-CA" i="1">
+                                  <a:latin typeface="Cambria Math" panose="02040503050406030204" pitchFamily="18" charset="0"/>
+                                  <a:ea typeface="Cambria Math" panose="02040503050406030204" pitchFamily="18" charset="0"/>
+                                </a:rPr>
+                                <m:t>𝛾</m:t>
+                              </m:r>
+                            </m:e>
+                            <m:sub>
+                              <m:r>
+                                <a:rPr lang="en-CA" b="0" i="1" smtClean="0">
+                                  <a:latin typeface="Cambria Math" panose="02040503050406030204" pitchFamily="18" charset="0"/>
+                                </a:rPr>
+                                <m:t>𝑥</m:t>
+                              </m:r>
+                            </m:sub>
+                          </m:sSub>
+                        </m:den>
+                      </m:f>
+                      <m:f>
+                        <m:fPr>
+                          <m:ctrlPr>
+                            <a:rPr lang="en-CA" b="0" i="1" smtClean="0">
+                              <a:latin typeface="Cambria Math" panose="02040503050406030204" pitchFamily="18" charset="0"/>
+                            </a:rPr>
+                          </m:ctrlPr>
+                        </m:fPr>
+                        <m:num>
+                          <m:r>
+                            <a:rPr lang="en-CA" b="0" i="1" smtClean="0">
+                              <a:latin typeface="Cambria Math" panose="02040503050406030204" pitchFamily="18" charset="0"/>
+                              <a:ea typeface="Cambria Math" panose="02040503050406030204" pitchFamily="18" charset="0"/>
+                            </a:rPr>
+                            <m:t>𝜕</m:t>
+                          </m:r>
+                        </m:num>
+                        <m:den>
+                          <m:r>
+                            <a:rPr lang="en-CA" b="0" i="1" smtClean="0">
+                              <a:latin typeface="Cambria Math" panose="02040503050406030204" pitchFamily="18" charset="0"/>
+                              <a:ea typeface="Cambria Math" panose="02040503050406030204" pitchFamily="18" charset="0"/>
+                            </a:rPr>
+                            <m:t>𝜕</m:t>
+                          </m:r>
+                          <m:r>
+                            <a:rPr lang="en-CA" b="0" i="1" smtClean="0">
+                              <a:latin typeface="Cambria Math" panose="02040503050406030204" pitchFamily="18" charset="0"/>
+                              <a:ea typeface="Cambria Math" panose="02040503050406030204" pitchFamily="18" charset="0"/>
+                            </a:rPr>
+                            <m:t>𝑥</m:t>
+                          </m:r>
+                        </m:den>
+                      </m:f>
+                      <m:d>
+                        <m:dPr>
+                          <m:ctrlPr>
+                            <a:rPr lang="en-CA" b="0" i="1" smtClean="0">
+                              <a:latin typeface="Cambria Math" panose="02040503050406030204" pitchFamily="18" charset="0"/>
+                            </a:rPr>
+                          </m:ctrlPr>
+                        </m:dPr>
+                        <m:e>
+                          <m:f>
+                            <m:fPr>
+                              <m:ctrlPr>
+                                <a:rPr lang="en-CA" i="1">
+                                  <a:latin typeface="Cambria Math" panose="02040503050406030204" pitchFamily="18" charset="0"/>
+                                </a:rPr>
+                              </m:ctrlPr>
+                            </m:fPr>
+                            <m:num>
+                              <m:r>
+                                <a:rPr lang="en-CA" i="1">
+                                  <a:latin typeface="Cambria Math" panose="02040503050406030204" pitchFamily="18" charset="0"/>
+                                </a:rPr>
+                                <m:t>1</m:t>
+                              </m:r>
+                            </m:num>
+                            <m:den>
+                              <m:sSub>
+                                <m:sSubPr>
+                                  <m:ctrlPr>
+                                    <a:rPr lang="en-CA" i="1">
+                                      <a:latin typeface="Cambria Math" panose="02040503050406030204" pitchFamily="18" charset="0"/>
+                                    </a:rPr>
+                                  </m:ctrlPr>
+                                </m:sSubPr>
+                                <m:e>
+                                  <m:r>
+                                    <a:rPr lang="en-CA" i="1">
+                                      <a:latin typeface="Cambria Math" panose="02040503050406030204" pitchFamily="18" charset="0"/>
+                                      <a:ea typeface="Cambria Math" panose="02040503050406030204" pitchFamily="18" charset="0"/>
+                                    </a:rPr>
+                                    <m:t>𝛾</m:t>
+                                  </m:r>
+                                </m:e>
+                                <m:sub>
+                                  <m:r>
+                                    <a:rPr lang="en-CA" i="1">
+                                      <a:latin typeface="Cambria Math" panose="02040503050406030204" pitchFamily="18" charset="0"/>
+                                    </a:rPr>
+                                    <m:t>𝑥</m:t>
+                                  </m:r>
+                                </m:sub>
+                              </m:sSub>
+                            </m:den>
+                          </m:f>
+                          <m:f>
+                            <m:fPr>
+                              <m:ctrlPr>
+                                <a:rPr lang="en-CA" i="1">
+                                  <a:latin typeface="Cambria Math" panose="02040503050406030204" pitchFamily="18" charset="0"/>
+                                </a:rPr>
+                              </m:ctrlPr>
+                            </m:fPr>
+                            <m:num>
+                              <m:r>
+                                <a:rPr lang="en-CA" i="1">
+                                  <a:latin typeface="Cambria Math" panose="02040503050406030204" pitchFamily="18" charset="0"/>
+                                  <a:ea typeface="Cambria Math" panose="02040503050406030204" pitchFamily="18" charset="0"/>
+                                </a:rPr>
+                                <m:t>𝜕</m:t>
+                              </m:r>
+                              <m:r>
+                                <a:rPr lang="en-CA" b="0" i="1" smtClean="0">
+                                  <a:latin typeface="Cambria Math" panose="02040503050406030204" pitchFamily="18" charset="0"/>
+                                  <a:ea typeface="Cambria Math" panose="02040503050406030204" pitchFamily="18" charset="0"/>
+                                </a:rPr>
+                                <m:t>𝑝</m:t>
+                              </m:r>
+                            </m:num>
+                            <m:den>
+                              <m:r>
+                                <a:rPr lang="en-CA" i="1">
+                                  <a:latin typeface="Cambria Math" panose="02040503050406030204" pitchFamily="18" charset="0"/>
+                                  <a:ea typeface="Cambria Math" panose="02040503050406030204" pitchFamily="18" charset="0"/>
+                                </a:rPr>
+                                <m:t>𝜕</m:t>
+                              </m:r>
+                              <m:r>
+                                <a:rPr lang="en-CA" i="1">
+                                  <a:latin typeface="Cambria Math" panose="02040503050406030204" pitchFamily="18" charset="0"/>
+                                  <a:ea typeface="Cambria Math" panose="02040503050406030204" pitchFamily="18" charset="0"/>
+                                </a:rPr>
+                                <m:t>𝑥</m:t>
+                              </m:r>
+                            </m:den>
+                          </m:f>
+                        </m:e>
+                      </m:d>
+                      <m:r>
+                        <a:rPr lang="en-CA" b="0" i="1" smtClean="0">
+                          <a:latin typeface="Cambria Math" panose="02040503050406030204" pitchFamily="18" charset="0"/>
+                        </a:rPr>
+                        <m:t>+</m:t>
+                      </m:r>
+                      <m:f>
+                        <m:fPr>
+                          <m:ctrlPr>
+                            <a:rPr lang="en-CA" i="1">
+                              <a:latin typeface="Cambria Math" panose="02040503050406030204" pitchFamily="18" charset="0"/>
+                            </a:rPr>
+                          </m:ctrlPr>
+                        </m:fPr>
+                        <m:num>
+                          <m:r>
+                            <a:rPr lang="en-CA" i="1">
+                              <a:latin typeface="Cambria Math" panose="02040503050406030204" pitchFamily="18" charset="0"/>
+                            </a:rPr>
+                            <m:t>1</m:t>
+                          </m:r>
+                        </m:num>
+                        <m:den>
+                          <m:sSub>
+                            <m:sSubPr>
+                              <m:ctrlPr>
+                                <a:rPr lang="en-CA" i="1">
+                                  <a:latin typeface="Cambria Math" panose="02040503050406030204" pitchFamily="18" charset="0"/>
+                                </a:rPr>
+                              </m:ctrlPr>
+                            </m:sSubPr>
+                            <m:e>
+                              <m:r>
+                                <a:rPr lang="en-CA" i="1">
+                                  <a:latin typeface="Cambria Math" panose="02040503050406030204" pitchFamily="18" charset="0"/>
+                                  <a:ea typeface="Cambria Math" panose="02040503050406030204" pitchFamily="18" charset="0"/>
+                                </a:rPr>
+                                <m:t>𝛾</m:t>
+                              </m:r>
+                            </m:e>
+                            <m:sub>
+                              <m:r>
+                                <a:rPr lang="en-CA" b="0" i="1" smtClean="0">
+                                  <a:latin typeface="Cambria Math" panose="02040503050406030204" pitchFamily="18" charset="0"/>
+                                  <a:ea typeface="Cambria Math" panose="02040503050406030204" pitchFamily="18" charset="0"/>
+                                </a:rPr>
+                                <m:t>𝑦</m:t>
+                              </m:r>
+                            </m:sub>
+                          </m:sSub>
+                        </m:den>
+                      </m:f>
+                      <m:f>
+                        <m:fPr>
+                          <m:ctrlPr>
+                            <a:rPr lang="en-CA" i="1">
+                              <a:latin typeface="Cambria Math" panose="02040503050406030204" pitchFamily="18" charset="0"/>
+                            </a:rPr>
+                          </m:ctrlPr>
+                        </m:fPr>
+                        <m:num>
+                          <m:r>
+                            <a:rPr lang="en-CA" i="1">
+                              <a:latin typeface="Cambria Math" panose="02040503050406030204" pitchFamily="18" charset="0"/>
+                              <a:ea typeface="Cambria Math" panose="02040503050406030204" pitchFamily="18" charset="0"/>
+                            </a:rPr>
+                            <m:t>𝜕</m:t>
+                          </m:r>
+                        </m:num>
+                        <m:den>
+                          <m:r>
+                            <a:rPr lang="en-CA" i="1">
+                              <a:latin typeface="Cambria Math" panose="02040503050406030204" pitchFamily="18" charset="0"/>
+                              <a:ea typeface="Cambria Math" panose="02040503050406030204" pitchFamily="18" charset="0"/>
+                            </a:rPr>
+                            <m:t>𝜕</m:t>
+                          </m:r>
+                          <m:r>
+                            <a:rPr lang="en-CA" b="0" i="1" smtClean="0">
+                              <a:latin typeface="Cambria Math" panose="02040503050406030204" pitchFamily="18" charset="0"/>
+                              <a:ea typeface="Cambria Math" panose="02040503050406030204" pitchFamily="18" charset="0"/>
+                            </a:rPr>
+                            <m:t>𝑦</m:t>
+                          </m:r>
+                        </m:den>
+                      </m:f>
+                      <m:d>
+                        <m:dPr>
+                          <m:ctrlPr>
+                            <a:rPr lang="en-CA" i="1">
+                              <a:latin typeface="Cambria Math" panose="02040503050406030204" pitchFamily="18" charset="0"/>
+                            </a:rPr>
+                          </m:ctrlPr>
+                        </m:dPr>
+                        <m:e>
+                          <m:f>
+                            <m:fPr>
+                              <m:ctrlPr>
+                                <a:rPr lang="en-CA" i="1">
+                                  <a:latin typeface="Cambria Math" panose="02040503050406030204" pitchFamily="18" charset="0"/>
+                                </a:rPr>
+                              </m:ctrlPr>
+                            </m:fPr>
+                            <m:num>
+                              <m:r>
+                                <a:rPr lang="en-CA" i="1">
+                                  <a:latin typeface="Cambria Math" panose="02040503050406030204" pitchFamily="18" charset="0"/>
+                                </a:rPr>
+                                <m:t>1</m:t>
+                              </m:r>
+                            </m:num>
+                            <m:den>
+                              <m:sSub>
+                                <m:sSubPr>
+                                  <m:ctrlPr>
+                                    <a:rPr lang="en-CA" i="1">
+                                      <a:latin typeface="Cambria Math" panose="02040503050406030204" pitchFamily="18" charset="0"/>
+                                    </a:rPr>
+                                  </m:ctrlPr>
+                                </m:sSubPr>
+                                <m:e>
+                                  <m:r>
+                                    <a:rPr lang="en-CA" i="1">
+                                      <a:latin typeface="Cambria Math" panose="02040503050406030204" pitchFamily="18" charset="0"/>
+                                      <a:ea typeface="Cambria Math" panose="02040503050406030204" pitchFamily="18" charset="0"/>
+                                    </a:rPr>
+                                    <m:t>𝛾</m:t>
+                                  </m:r>
+                                </m:e>
+                                <m:sub>
+                                  <m:r>
+                                    <a:rPr lang="en-CA" i="1">
+                                      <a:latin typeface="Cambria Math" panose="02040503050406030204" pitchFamily="18" charset="0"/>
+                                      <a:ea typeface="Cambria Math" panose="02040503050406030204" pitchFamily="18" charset="0"/>
+                                    </a:rPr>
+                                    <m:t>𝑦</m:t>
+                                  </m:r>
+                                </m:sub>
+                              </m:sSub>
+                            </m:den>
+                          </m:f>
+                          <m:f>
+                            <m:fPr>
+                              <m:ctrlPr>
+                                <a:rPr lang="en-CA" i="1">
+                                  <a:latin typeface="Cambria Math" panose="02040503050406030204" pitchFamily="18" charset="0"/>
+                                </a:rPr>
+                              </m:ctrlPr>
+                            </m:fPr>
+                            <m:num>
+                              <m:r>
+                                <a:rPr lang="en-CA" i="1">
+                                  <a:latin typeface="Cambria Math" panose="02040503050406030204" pitchFamily="18" charset="0"/>
+                                  <a:ea typeface="Cambria Math" panose="02040503050406030204" pitchFamily="18" charset="0"/>
+                                </a:rPr>
+                                <m:t>𝜕</m:t>
+                              </m:r>
+                              <m:r>
+                                <a:rPr lang="en-CA" i="1">
+                                  <a:latin typeface="Cambria Math" panose="02040503050406030204" pitchFamily="18" charset="0"/>
+                                  <a:ea typeface="Cambria Math" panose="02040503050406030204" pitchFamily="18" charset="0"/>
+                                </a:rPr>
+                                <m:t>𝑝</m:t>
+                              </m:r>
+                            </m:num>
+                            <m:den>
+                              <m:r>
+                                <a:rPr lang="en-CA" i="1">
+                                  <a:latin typeface="Cambria Math" panose="02040503050406030204" pitchFamily="18" charset="0"/>
+                                  <a:ea typeface="Cambria Math" panose="02040503050406030204" pitchFamily="18" charset="0"/>
+                                </a:rPr>
+                                <m:t>𝜕</m:t>
+                              </m:r>
+                              <m:r>
+                                <a:rPr lang="en-CA" b="0" i="1" smtClean="0">
+                                  <a:latin typeface="Cambria Math" panose="02040503050406030204" pitchFamily="18" charset="0"/>
+                                  <a:ea typeface="Cambria Math" panose="02040503050406030204" pitchFamily="18" charset="0"/>
+                                </a:rPr>
+                                <m:t>𝑦</m:t>
+                              </m:r>
+                            </m:den>
+                          </m:f>
+                        </m:e>
+                      </m:d>
+                      <m:r>
+                        <a:rPr lang="en-CA" b="0" i="1" smtClean="0">
+                          <a:latin typeface="Cambria Math" panose="02040503050406030204" pitchFamily="18" charset="0"/>
+                          <a:ea typeface="Cambria Math" panose="02040503050406030204" pitchFamily="18" charset="0"/>
+                        </a:rPr>
+                        <m:t>+</m:t>
+                      </m:r>
+                      <m:sSup>
+                        <m:sSupPr>
+                          <m:ctrlPr>
+                            <a:rPr lang="en-CA" b="0" i="1" smtClean="0">
+                              <a:latin typeface="Cambria Math" panose="02040503050406030204" pitchFamily="18" charset="0"/>
+                              <a:ea typeface="Cambria Math" panose="02040503050406030204" pitchFamily="18" charset="0"/>
+                            </a:rPr>
+                          </m:ctrlPr>
+                        </m:sSupPr>
+                        <m:e>
+                          <m:r>
+                            <a:rPr lang="en-CA" b="0" i="1" smtClean="0">
+                              <a:latin typeface="Cambria Math" panose="02040503050406030204" pitchFamily="18" charset="0"/>
+                              <a:ea typeface="Cambria Math" panose="02040503050406030204" pitchFamily="18" charset="0"/>
+                            </a:rPr>
+                            <m:t>𝑘</m:t>
+                          </m:r>
+                        </m:e>
+                        <m:sup>
+                          <m:r>
+                            <a:rPr lang="en-CA" b="0" i="1" smtClean="0">
+                              <a:latin typeface="Cambria Math" panose="02040503050406030204" pitchFamily="18" charset="0"/>
+                              <a:ea typeface="Cambria Math" panose="02040503050406030204" pitchFamily="18" charset="0"/>
+                            </a:rPr>
+                            <m:t>2</m:t>
+                          </m:r>
+                        </m:sup>
+                      </m:sSup>
+                      <m:r>
+                        <a:rPr lang="en-CA" b="0" i="1" smtClean="0">
+                          <a:latin typeface="Cambria Math" panose="02040503050406030204" pitchFamily="18" charset="0"/>
+                          <a:ea typeface="Cambria Math" panose="02040503050406030204" pitchFamily="18" charset="0"/>
+                        </a:rPr>
+                        <m:t>𝑝</m:t>
+                      </m:r>
+                      <m:r>
+                        <a:rPr lang="en-CA" b="0" i="1" smtClean="0">
+                          <a:latin typeface="Cambria Math" panose="02040503050406030204" pitchFamily="18" charset="0"/>
+                          <a:ea typeface="Cambria Math" panose="02040503050406030204" pitchFamily="18" charset="0"/>
+                        </a:rPr>
+                        <m:t>=0</m:t>
+                      </m:r>
+                    </m:oMath>
+                  </m:oMathPara>
+                </a14:m>
+                <a:endParaRPr lang="en-CA" b="0" dirty="0"/>
+              </a:p>
+            </p:txBody>
+          </p:sp>
+        </mc:Choice>
+        <mc:Fallback>
+          <p:sp>
+            <p:nvSpPr>
+              <p:cNvPr id="11" name="TextBox 10">
+                <a:extLst>
+                  <a:ext uri="{FF2B5EF4-FFF2-40B4-BE49-F238E27FC236}">
+                    <a16:creationId xmlns:a16="http://schemas.microsoft.com/office/drawing/2014/main" id="{003D2D0D-0D3C-475B-91BF-156AA8591FA5}"/>
+                  </a:ext>
+                </a:extLst>
+              </p:cNvPr>
+              <p:cNvSpPr txBox="1">
+                <a:spLocks noRot="1" noChangeAspect="1" noMove="1" noResize="1" noEditPoints="1" noAdjustHandles="1" noChangeArrowheads="1" noChangeShapeType="1" noTextEdit="1"/>
+              </p:cNvSpPr>
+              <p:nvPr/>
+            </p:nvSpPr>
+            <p:spPr>
+              <a:xfrm>
+                <a:off x="1799376" y="5988957"/>
+                <a:ext cx="4096571" cy="627929"/>
+              </a:xfrm>
+              <a:prstGeom prst="rect">
+                <a:avLst/>
+              </a:prstGeom>
+              <a:blipFill>
+                <a:blip r:embed="rId5"/>
+                <a:stretch>
+                  <a:fillRect/>
+                </a:stretch>
+              </a:blipFill>
+            </p:spPr>
+            <p:txBody>
+              <a:bodyPr/>
+              <a:lstStyle/>
+              <a:p>
+                <a:r>
+                  <a:rPr lang="en-CA">
+                    <a:noFill/>
+                  </a:rPr>
+                  <a:t> </a:t>
+                </a:r>
+              </a:p>
+            </p:txBody>
+          </p:sp>
+        </mc:Fallback>
+      </mc:AlternateContent>
+      <mc:AlternateContent xmlns:mc="http://schemas.openxmlformats.org/markup-compatibility/2006">
+        <mc:Choice xmlns:a14="http://schemas.microsoft.com/office/drawing/2010/main" Requires="a14">
+          <p:sp>
+            <p:nvSpPr>
+              <p:cNvPr id="18" name="TextBox 17">
+                <a:extLst>
+                  <a:ext uri="{FF2B5EF4-FFF2-40B4-BE49-F238E27FC236}">
+                    <a16:creationId xmlns:a16="http://schemas.microsoft.com/office/drawing/2014/main" id="{EE8FEC50-193D-403C-BC60-7C3621ED8DCA}"/>
+                  </a:ext>
+                </a:extLst>
+              </p:cNvPr>
+              <p:cNvSpPr txBox="1"/>
+              <p:nvPr/>
+            </p:nvSpPr>
+            <p:spPr>
+              <a:xfrm>
+                <a:off x="6254330" y="5988957"/>
+                <a:ext cx="2029658" cy="567463"/>
+              </a:xfrm>
+              <a:prstGeom prst="rect">
+                <a:avLst/>
+              </a:prstGeom>
+              <a:noFill/>
+            </p:spPr>
+            <p:txBody>
+              <a:bodyPr wrap="none" lIns="0" tIns="0" rIns="0" bIns="0" rtlCol="0">
+                <a:spAutoFit/>
+              </a:bodyPr>
+              <a:lstStyle/>
+              <a:p>
+                <a14:m>
+                  <m:oMathPara xmlns:m="http://schemas.openxmlformats.org/officeDocument/2006/math">
+                    <m:oMathParaPr>
+                      <m:jc m:val="centerGroup"/>
+                    </m:oMathParaPr>
+                    <m:oMath xmlns:m="http://schemas.openxmlformats.org/officeDocument/2006/math">
+                      <m:sSub>
+                        <m:sSubPr>
+                          <m:ctrlPr>
+                            <a:rPr lang="en-CA" i="1">
+                              <a:latin typeface="Cambria Math" panose="02040503050406030204" pitchFamily="18" charset="0"/>
+                            </a:rPr>
+                          </m:ctrlPr>
+                        </m:sSubPr>
+                        <m:e>
+                          <m:r>
+                            <a:rPr lang="en-CA" i="1">
+                              <a:latin typeface="Cambria Math" panose="02040503050406030204" pitchFamily="18" charset="0"/>
+                              <a:ea typeface="Cambria Math" panose="02040503050406030204" pitchFamily="18" charset="0"/>
+                            </a:rPr>
+                            <m:t>𝛾</m:t>
+                          </m:r>
+                        </m:e>
+                        <m:sub>
+                          <m:r>
+                            <a:rPr lang="en-CA" i="1">
+                              <a:latin typeface="Cambria Math" panose="02040503050406030204" pitchFamily="18" charset="0"/>
+                            </a:rPr>
+                            <m:t>𝑥</m:t>
+                          </m:r>
+                        </m:sub>
+                      </m:sSub>
+                      <m:r>
+                        <a:rPr lang="en-CA" b="0" i="1" smtClean="0">
+                          <a:latin typeface="Cambria Math" panose="02040503050406030204" pitchFamily="18" charset="0"/>
+                          <a:ea typeface="Cambria Math" panose="02040503050406030204" pitchFamily="18" charset="0"/>
+                        </a:rPr>
+                        <m:t>=1+ </m:t>
+                      </m:r>
+                      <m:f>
+                        <m:fPr>
+                          <m:ctrlPr>
+                            <a:rPr lang="en-CA" b="0" i="1" smtClean="0">
+                              <a:latin typeface="Cambria Math" panose="02040503050406030204" pitchFamily="18" charset="0"/>
+                              <a:ea typeface="Cambria Math" panose="02040503050406030204" pitchFamily="18" charset="0"/>
+                            </a:rPr>
+                          </m:ctrlPr>
+                        </m:fPr>
+                        <m:num>
+                          <m:r>
+                            <a:rPr lang="en-CA" b="0" i="1" smtClean="0">
+                              <a:latin typeface="Cambria Math" panose="02040503050406030204" pitchFamily="18" charset="0"/>
+                              <a:ea typeface="Cambria Math" panose="02040503050406030204" pitchFamily="18" charset="0"/>
+                            </a:rPr>
+                            <m:t>𝑖</m:t>
+                          </m:r>
+                        </m:num>
+                        <m:den>
+                          <m:r>
+                            <a:rPr lang="en-CA" b="0" i="1" smtClean="0">
+                              <a:latin typeface="Cambria Math" panose="02040503050406030204" pitchFamily="18" charset="0"/>
+                              <a:ea typeface="Cambria Math" panose="02040503050406030204" pitchFamily="18" charset="0"/>
+                            </a:rPr>
+                            <m:t>𝜔</m:t>
+                          </m:r>
+                        </m:den>
+                      </m:f>
+                      <m:f>
+                        <m:fPr>
+                          <m:ctrlPr>
+                            <a:rPr lang="en-CA" b="0" i="1" smtClean="0">
+                              <a:latin typeface="Cambria Math" panose="02040503050406030204" pitchFamily="18" charset="0"/>
+                              <a:ea typeface="Cambria Math" panose="02040503050406030204" pitchFamily="18" charset="0"/>
+                            </a:rPr>
+                          </m:ctrlPr>
+                        </m:fPr>
+                        <m:num>
+                          <m:r>
+                            <a:rPr lang="en-CA" b="0" i="1" smtClean="0">
+                              <a:latin typeface="Cambria Math" panose="02040503050406030204" pitchFamily="18" charset="0"/>
+                              <a:ea typeface="Cambria Math" panose="02040503050406030204" pitchFamily="18" charset="0"/>
+                            </a:rPr>
+                            <m:t>1</m:t>
+                          </m:r>
+                        </m:num>
+                        <m:den>
+                          <m:d>
+                            <m:dPr>
+                              <m:begChr m:val="|"/>
+                              <m:endChr m:val="|"/>
+                              <m:ctrlPr>
+                                <a:rPr lang="en-CA" b="0" i="1" smtClean="0">
+                                  <a:latin typeface="Cambria Math" panose="02040503050406030204" pitchFamily="18" charset="0"/>
+                                  <a:ea typeface="Cambria Math" panose="02040503050406030204" pitchFamily="18" charset="0"/>
+                                </a:rPr>
+                              </m:ctrlPr>
+                            </m:dPr>
+                            <m:e>
+                              <m:sSub>
+                                <m:sSubPr>
+                                  <m:ctrlPr>
+                                    <a:rPr lang="en-CA" b="0" i="1" smtClean="0">
+                                      <a:latin typeface="Cambria Math" panose="02040503050406030204" pitchFamily="18" charset="0"/>
+                                      <a:ea typeface="Cambria Math" panose="02040503050406030204" pitchFamily="18" charset="0"/>
+                                    </a:rPr>
+                                  </m:ctrlPr>
+                                </m:sSubPr>
+                                <m:e>
+                                  <m:r>
+                                    <a:rPr lang="en-CA" b="0" i="1" smtClean="0">
+                                      <a:latin typeface="Cambria Math" panose="02040503050406030204" pitchFamily="18" charset="0"/>
+                                      <a:ea typeface="Cambria Math" panose="02040503050406030204" pitchFamily="18" charset="0"/>
+                                    </a:rPr>
+                                    <m:t>𝑥</m:t>
+                                  </m:r>
+                                </m:e>
+                                <m:sub>
+                                  <m:r>
+                                    <a:rPr lang="en-CA" b="0" i="1" smtClean="0">
+                                      <a:latin typeface="Cambria Math" panose="02040503050406030204" pitchFamily="18" charset="0"/>
+                                      <a:ea typeface="Cambria Math" panose="02040503050406030204" pitchFamily="18" charset="0"/>
+                                    </a:rPr>
+                                    <m:t>0</m:t>
+                                  </m:r>
+                                </m:sub>
+                              </m:sSub>
+                              <m:r>
+                                <a:rPr lang="en-CA" b="0" i="1" smtClean="0">
+                                  <a:latin typeface="Cambria Math" panose="02040503050406030204" pitchFamily="18" charset="0"/>
+                                  <a:ea typeface="Cambria Math" panose="02040503050406030204" pitchFamily="18" charset="0"/>
+                                </a:rPr>
+                                <m:t>−</m:t>
+                              </m:r>
+                              <m:r>
+                                <a:rPr lang="en-CA" b="0" i="1" smtClean="0">
+                                  <a:latin typeface="Cambria Math" panose="02040503050406030204" pitchFamily="18" charset="0"/>
+                                  <a:ea typeface="Cambria Math" panose="02040503050406030204" pitchFamily="18" charset="0"/>
+                                </a:rPr>
+                                <m:t>𝑥</m:t>
+                              </m:r>
+                            </m:e>
+                          </m:d>
+                        </m:den>
+                      </m:f>
+                    </m:oMath>
+                  </m:oMathPara>
+                </a14:m>
+                <a:endParaRPr lang="en-CA" dirty="0"/>
+              </a:p>
+            </p:txBody>
+          </p:sp>
+        </mc:Choice>
+        <mc:Fallback>
+          <p:sp>
+            <p:nvSpPr>
+              <p:cNvPr id="18" name="TextBox 17">
+                <a:extLst>
+                  <a:ext uri="{FF2B5EF4-FFF2-40B4-BE49-F238E27FC236}">
+                    <a16:creationId xmlns:a16="http://schemas.microsoft.com/office/drawing/2014/main" id="{EE8FEC50-193D-403C-BC60-7C3621ED8DCA}"/>
+                  </a:ext>
+                </a:extLst>
+              </p:cNvPr>
+              <p:cNvSpPr txBox="1">
+                <a:spLocks noRot="1" noChangeAspect="1" noMove="1" noResize="1" noEditPoints="1" noAdjustHandles="1" noChangeArrowheads="1" noChangeShapeType="1" noTextEdit="1"/>
+              </p:cNvSpPr>
+              <p:nvPr/>
+            </p:nvSpPr>
+            <p:spPr>
+              <a:xfrm>
+                <a:off x="6254330" y="5988957"/>
+                <a:ext cx="2029658" cy="567463"/>
+              </a:xfrm>
+              <a:prstGeom prst="rect">
+                <a:avLst/>
+              </a:prstGeom>
+              <a:blipFill>
+                <a:blip r:embed="rId6"/>
+                <a:stretch>
+                  <a:fillRect/>
+                </a:stretch>
+              </a:blipFill>
+            </p:spPr>
+            <p:txBody>
+              <a:bodyPr/>
+              <a:lstStyle/>
+              <a:p>
+                <a:r>
+                  <a:rPr lang="en-CA">
+                    <a:noFill/>
+                  </a:rPr>
+                  <a:t> </a:t>
+                </a:r>
+              </a:p>
+            </p:txBody>
+          </p:sp>
+        </mc:Fallback>
+      </mc:AlternateContent>
     </p:spTree>
     <p:extLst>
       <p:ext uri="{BB962C8B-B14F-4D97-AF65-F5344CB8AC3E}">
@@ -15030,6 +16131,373 @@
 </file>
 
 <file path=ppt/slides/slide7.xml><?xml version="1.0" encoding="utf-8"?>
+<p:sld xmlns:a="http://schemas.openxmlformats.org/drawingml/2006/main" xmlns:r="http://schemas.openxmlformats.org/officeDocument/2006/relationships" xmlns:p="http://schemas.openxmlformats.org/presentationml/2006/main">
+  <p:cSld>
+    <p:spTree>
+      <p:nvGrpSpPr>
+        <p:cNvPr id="1" name=""/>
+        <p:cNvGrpSpPr/>
+        <p:nvPr/>
+      </p:nvGrpSpPr>
+      <p:grpSpPr>
+        <a:xfrm>
+          <a:off x="0" y="0"/>
+          <a:ext cx="0" cy="0"/>
+          <a:chOff x="0" y="0"/>
+          <a:chExt cx="0" cy="0"/>
+        </a:xfrm>
+      </p:grpSpPr>
+      <p:sp>
+        <p:nvSpPr>
+          <p:cNvPr id="2" name="Titre 1">
+            <a:extLst>
+              <a:ext uri="{FF2B5EF4-FFF2-40B4-BE49-F238E27FC236}">
+                <a16:creationId xmlns:a16="http://schemas.microsoft.com/office/drawing/2014/main" id="{03EE799C-7398-441E-956D-60778EB6ADFB}"/>
+              </a:ext>
+            </a:extLst>
+          </p:cNvPr>
+          <p:cNvSpPr txBox="1">
+            <a:spLocks/>
+          </p:cNvSpPr>
+          <p:nvPr/>
+        </p:nvSpPr>
+        <p:spPr>
+          <a:xfrm>
+            <a:off x="455643" y="510175"/>
+            <a:ext cx="6893113" cy="739786"/>
+          </a:xfrm>
+          <a:prstGeom prst="rect">
+            <a:avLst/>
+          </a:prstGeom>
+        </p:spPr>
+        <p:txBody>
+          <a:bodyPr/>
+          <a:lstStyle>
+            <a:lvl1pPr algn="l" defTabSz="457200" rtl="0" eaLnBrk="1" latinLnBrk="0" hangingPunct="1">
+              <a:spcBef>
+                <a:spcPct val="0"/>
+              </a:spcBef>
+              <a:buNone/>
+              <a:defRPr sz="3600" kern="1200">
+                <a:solidFill>
+                  <a:schemeClr val="accent1"/>
+                </a:solidFill>
+                <a:latin typeface="+mj-lt"/>
+                <a:ea typeface="+mj-ea"/>
+                <a:cs typeface="+mj-cs"/>
+              </a:defRPr>
+            </a:lvl1pPr>
+            <a:lvl2pPr eaLnBrk="1" hangingPunct="1">
+              <a:defRPr>
+                <a:solidFill>
+                  <a:schemeClr val="tx2"/>
+                </a:solidFill>
+              </a:defRPr>
+            </a:lvl2pPr>
+            <a:lvl3pPr eaLnBrk="1" hangingPunct="1">
+              <a:defRPr>
+                <a:solidFill>
+                  <a:schemeClr val="tx2"/>
+                </a:solidFill>
+              </a:defRPr>
+            </a:lvl3pPr>
+            <a:lvl4pPr eaLnBrk="1" hangingPunct="1">
+              <a:defRPr>
+                <a:solidFill>
+                  <a:schemeClr val="tx2"/>
+                </a:solidFill>
+              </a:defRPr>
+            </a:lvl4pPr>
+            <a:lvl5pPr eaLnBrk="1" hangingPunct="1">
+              <a:defRPr>
+                <a:solidFill>
+                  <a:schemeClr val="tx2"/>
+                </a:solidFill>
+              </a:defRPr>
+            </a:lvl5pPr>
+            <a:lvl6pPr eaLnBrk="1" hangingPunct="1">
+              <a:defRPr>
+                <a:solidFill>
+                  <a:schemeClr val="tx2"/>
+                </a:solidFill>
+              </a:defRPr>
+            </a:lvl6pPr>
+            <a:lvl7pPr eaLnBrk="1" hangingPunct="1">
+              <a:defRPr>
+                <a:solidFill>
+                  <a:schemeClr val="tx2"/>
+                </a:solidFill>
+              </a:defRPr>
+            </a:lvl7pPr>
+            <a:lvl8pPr eaLnBrk="1" hangingPunct="1">
+              <a:defRPr>
+                <a:solidFill>
+                  <a:schemeClr val="tx2"/>
+                </a:solidFill>
+              </a:defRPr>
+            </a:lvl8pPr>
+            <a:lvl9pPr eaLnBrk="1" hangingPunct="1">
+              <a:defRPr>
+                <a:solidFill>
+                  <a:schemeClr val="tx2"/>
+                </a:solidFill>
+              </a:defRPr>
+            </a:lvl9pPr>
+          </a:lstStyle>
+          <a:p>
+            <a:r>
+              <a:rPr lang="fr-CA" dirty="0">
+                <a:solidFill>
+                  <a:srgbClr val="286D9F"/>
+                </a:solidFill>
+              </a:rPr>
+              <a:t>Importance des </a:t>
+            </a:r>
+            <a:r>
+              <a:rPr lang="fr-CA" dirty="0" err="1">
+                <a:solidFill>
+                  <a:srgbClr val="286D9F"/>
+                </a:solidFill>
+              </a:rPr>
+              <a:t>PMLs</a:t>
+            </a:r>
+            <a:endParaRPr lang="fr-CA" dirty="0">
+              <a:solidFill>
+                <a:srgbClr val="286D9F"/>
+              </a:solidFill>
+            </a:endParaRPr>
+          </a:p>
+        </p:txBody>
+      </p:sp>
+      <p:pic>
+        <p:nvPicPr>
+          <p:cNvPr id="18" name="PML">
+            <a:hlinkClick r:id="" action="ppaction://media"/>
+            <a:extLst>
+              <a:ext uri="{FF2B5EF4-FFF2-40B4-BE49-F238E27FC236}">
+                <a16:creationId xmlns:a16="http://schemas.microsoft.com/office/drawing/2014/main" id="{D638BE9F-ED6A-4197-8270-967572969F81}"/>
+              </a:ext>
+            </a:extLst>
+          </p:cNvPr>
+          <p:cNvPicPr>
+            <a:picLocks noChangeAspect="1"/>
+          </p:cNvPicPr>
+          <p:nvPr>
+            <a:videoFile r:link="rId2"/>
+            <p:extLst>
+              <p:ext uri="{DAA4B4D4-6D71-4841-9C94-3DE7FCFB9230}">
+                <p14:media xmlns:p14="http://schemas.microsoft.com/office/powerpoint/2010/main" r:embed="rId1"/>
+              </p:ext>
+            </p:extLst>
+          </p:nvPr>
+        </p:nvPicPr>
+        <p:blipFill>
+          <a:blip r:embed="rId4"/>
+          <a:stretch>
+            <a:fillRect/>
+          </a:stretch>
+        </p:blipFill>
+        <p:spPr>
+          <a:xfrm>
+            <a:off x="1896891" y="1249961"/>
+            <a:ext cx="8398218" cy="4821943"/>
+          </a:xfrm>
+          <a:prstGeom prst="rect">
+            <a:avLst/>
+          </a:prstGeom>
+        </p:spPr>
+      </p:pic>
+      <p:sp>
+        <p:nvSpPr>
+          <p:cNvPr id="20" name="ZoneTexte 10">
+            <a:extLst>
+              <a:ext uri="{FF2B5EF4-FFF2-40B4-BE49-F238E27FC236}">
+                <a16:creationId xmlns:a16="http://schemas.microsoft.com/office/drawing/2014/main" id="{6C686932-408F-4A52-A456-ECC5BD316C56}"/>
+              </a:ext>
+            </a:extLst>
+          </p:cNvPr>
+          <p:cNvSpPr txBox="1"/>
+          <p:nvPr/>
+        </p:nvSpPr>
+        <p:spPr>
+          <a:xfrm>
+            <a:off x="1896891" y="6071904"/>
+            <a:ext cx="8398218" cy="261610"/>
+          </a:xfrm>
+          <a:prstGeom prst="rect">
+            <a:avLst/>
+          </a:prstGeom>
+          <a:noFill/>
+        </p:spPr>
+        <p:txBody>
+          <a:bodyPr wrap="square" rtlCol="0">
+            <a:spAutoFit/>
+          </a:bodyPr>
+          <a:lstStyle/>
+          <a:p>
+            <a:r>
+              <a:rPr lang="fr-CA" sz="1100" dirty="0">
+                <a:solidFill>
+                  <a:schemeClr val="tx1">
+                    <a:lumMod val="85000"/>
+                    <a:lumOff val="15000"/>
+                  </a:schemeClr>
+                </a:solidFill>
+              </a:rPr>
+              <a:t>Vidéo 1 : Comparaison entre une propagation d’onde avec PML et une propagation sans PML [3]</a:t>
+            </a:r>
+          </a:p>
+        </p:txBody>
+      </p:sp>
+    </p:spTree>
+    <p:extLst>
+      <p:ext uri="{BB962C8B-B14F-4D97-AF65-F5344CB8AC3E}">
+        <p14:creationId xmlns:p14="http://schemas.microsoft.com/office/powerpoint/2010/main" val="4230701236"/>
+      </p:ext>
+    </p:extLst>
+  </p:cSld>
+  <p:clrMapOvr>
+    <a:masterClrMapping/>
+  </p:clrMapOvr>
+  <p:timing>
+    <p:tnLst>
+      <p:par>
+        <p:cTn id="1" dur="indefinite" restart="never" nodeType="tmRoot">
+          <p:childTnLst>
+            <p:seq concurrent="1" nextAc="seek">
+              <p:cTn id="2" dur="indefinite" nodeType="mainSeq">
+                <p:childTnLst>
+                  <p:par>
+                    <p:cTn id="3" fill="hold">
+                      <p:stCondLst>
+                        <p:cond delay="indefinite"/>
+                      </p:stCondLst>
+                      <p:childTnLst>
+                        <p:par>
+                          <p:cTn id="4" fill="hold">
+                            <p:stCondLst>
+                              <p:cond delay="0"/>
+                            </p:stCondLst>
+                            <p:childTnLst>
+                              <p:par>
+                                <p:cTn id="5" presetID="1" presetClass="mediacall" presetSubtype="0" fill="hold" nodeType="clickEffect">
+                                  <p:stCondLst>
+                                    <p:cond delay="0"/>
+                                  </p:stCondLst>
+                                  <p:childTnLst>
+                                    <p:cmd type="call" cmd="playFrom(0.0)">
+                                      <p:cBhvr>
+                                        <p:cTn id="6" dur="10193" fill="hold"/>
+                                        <p:tgtEl>
+                                          <p:spTgt spid="18"/>
+                                        </p:tgtEl>
+                                      </p:cBhvr>
+                                    </p:cmd>
+                                  </p:childTnLst>
+                                </p:cTn>
+                              </p:par>
+                            </p:childTnLst>
+                          </p:cTn>
+                        </p:par>
+                      </p:childTnLst>
+                    </p:cTn>
+                  </p:par>
+                </p:childTnLst>
+              </p:cTn>
+              <p:prevCondLst>
+                <p:cond evt="onPrev" delay="0">
+                  <p:tgtEl>
+                    <p:sldTgt/>
+                  </p:tgtEl>
+                </p:cond>
+              </p:prevCondLst>
+              <p:nextCondLst>
+                <p:cond evt="onNext" delay="0">
+                  <p:tgtEl>
+                    <p:sldTgt/>
+                  </p:tgtEl>
+                </p:cond>
+              </p:nextCondLst>
+            </p:seq>
+            <p:video>
+              <p:cMediaNode vol="80000">
+                <p:cTn id="7" fill="hold" display="0">
+                  <p:stCondLst>
+                    <p:cond delay="indefinite"/>
+                  </p:stCondLst>
+                </p:cTn>
+                <p:tgtEl>
+                  <p:spTgt spid="18"/>
+                </p:tgtEl>
+              </p:cMediaNode>
+            </p:video>
+            <p:seq concurrent="1" nextAc="seek">
+              <p:cTn id="8" restart="whenNotActive" fill="hold" evtFilter="cancelBubble" nodeType="interactiveSeq">
+                <p:stCondLst>
+                  <p:cond evt="onClick" delay="0">
+                    <p:tgtEl>
+                      <p:spTgt spid="18"/>
+                    </p:tgtEl>
+                  </p:cond>
+                </p:stCondLst>
+                <p:endSync evt="end" delay="0">
+                  <p:rtn val="all"/>
+                </p:endSync>
+                <p:childTnLst>
+                  <p:par>
+                    <p:cTn id="9" fill="hold">
+                      <p:stCondLst>
+                        <p:cond delay="0"/>
+                      </p:stCondLst>
+                      <p:childTnLst>
+                        <p:par>
+                          <p:cTn id="10" fill="hold">
+                            <p:stCondLst>
+                              <p:cond delay="0"/>
+                            </p:stCondLst>
+                            <p:childTnLst>
+                              <p:par>
+                                <p:cTn id="11" presetID="2" presetClass="mediacall" presetSubtype="0" fill="hold" nodeType="clickEffect">
+                                  <p:stCondLst>
+                                    <p:cond delay="0"/>
+                                  </p:stCondLst>
+                                  <p:childTnLst>
+                                    <p:cmd type="call" cmd="togglePause">
+                                      <p:cBhvr>
+                                        <p:cTn id="12" dur="1" fill="hold"/>
+                                        <p:tgtEl>
+                                          <p:spTgt spid="18"/>
+                                        </p:tgtEl>
+                                      </p:cBhvr>
+                                    </p:cmd>
+                                  </p:childTnLst>
+                                </p:cTn>
+                              </p:par>
+                            </p:childTnLst>
+                          </p:cTn>
+                        </p:par>
+                      </p:childTnLst>
+                    </p:cTn>
+                  </p:par>
+                </p:childTnLst>
+              </p:cTn>
+              <p:nextCondLst>
+                <p:cond evt="onClick" delay="0">
+                  <p:tgtEl>
+                    <p:spTgt spid="18"/>
+                  </p:tgtEl>
+                </p:cond>
+              </p:nextCondLst>
+            </p:seq>
+          </p:childTnLst>
+        </p:cTn>
+      </p:par>
+    </p:tnLst>
+  </p:timing>
+</p:sld>
+</file>
+
+<file path=ppt/slides/slide8.xml><?xml version="1.0" encoding="utf-8"?>
 <p:sld xmlns:a="http://schemas.openxmlformats.org/drawingml/2006/main" xmlns:r="http://schemas.openxmlformats.org/officeDocument/2006/relationships" xmlns:p="http://schemas.openxmlformats.org/presentationml/2006/main">
   <p:cSld>
     <p:spTree>
@@ -15627,180 +17095,6 @@
 </p:sld>
 </file>
 
-<file path=ppt/slides/slide8.xml><?xml version="1.0" encoding="utf-8"?>
-<p:sld xmlns:a="http://schemas.openxmlformats.org/drawingml/2006/main" xmlns:r="http://schemas.openxmlformats.org/officeDocument/2006/relationships" xmlns:p="http://schemas.openxmlformats.org/presentationml/2006/main">
-  <p:cSld>
-    <p:spTree>
-      <p:nvGrpSpPr>
-        <p:cNvPr id="1" name=""/>
-        <p:cNvGrpSpPr/>
-        <p:nvPr/>
-      </p:nvGrpSpPr>
-      <p:grpSpPr>
-        <a:xfrm>
-          <a:off x="0" y="0"/>
-          <a:ext cx="0" cy="0"/>
-          <a:chOff x="0" y="0"/>
-          <a:chExt cx="0" cy="0"/>
-        </a:xfrm>
-      </p:grpSpPr>
-      <p:sp>
-        <p:nvSpPr>
-          <p:cNvPr id="2" name="Titre 1">
-            <a:extLst>
-              <a:ext uri="{FF2B5EF4-FFF2-40B4-BE49-F238E27FC236}">
-                <a16:creationId xmlns:a16="http://schemas.microsoft.com/office/drawing/2014/main" id="{03EE799C-7398-441E-956D-60778EB6ADFB}"/>
-              </a:ext>
-            </a:extLst>
-          </p:cNvPr>
-          <p:cNvSpPr txBox="1">
-            <a:spLocks/>
-          </p:cNvSpPr>
-          <p:nvPr/>
-        </p:nvSpPr>
-        <p:spPr>
-          <a:xfrm>
-            <a:off x="455643" y="510175"/>
-            <a:ext cx="9015528" cy="739786"/>
-          </a:xfrm>
-          <a:prstGeom prst="rect">
-            <a:avLst/>
-          </a:prstGeom>
-        </p:spPr>
-        <p:txBody>
-          <a:bodyPr/>
-          <a:lstStyle>
-            <a:lvl1pPr algn="l" defTabSz="457200" rtl="0" eaLnBrk="1" latinLnBrk="0" hangingPunct="1">
-              <a:spcBef>
-                <a:spcPct val="0"/>
-              </a:spcBef>
-              <a:buNone/>
-              <a:defRPr sz="3600" kern="1200">
-                <a:solidFill>
-                  <a:schemeClr val="accent1"/>
-                </a:solidFill>
-                <a:latin typeface="+mj-lt"/>
-                <a:ea typeface="+mj-ea"/>
-                <a:cs typeface="+mj-cs"/>
-              </a:defRPr>
-            </a:lvl1pPr>
-            <a:lvl2pPr eaLnBrk="1" hangingPunct="1">
-              <a:defRPr>
-                <a:solidFill>
-                  <a:schemeClr val="tx2"/>
-                </a:solidFill>
-              </a:defRPr>
-            </a:lvl2pPr>
-            <a:lvl3pPr eaLnBrk="1" hangingPunct="1">
-              <a:defRPr>
-                <a:solidFill>
-                  <a:schemeClr val="tx2"/>
-                </a:solidFill>
-              </a:defRPr>
-            </a:lvl3pPr>
-            <a:lvl4pPr eaLnBrk="1" hangingPunct="1">
-              <a:defRPr>
-                <a:solidFill>
-                  <a:schemeClr val="tx2"/>
-                </a:solidFill>
-              </a:defRPr>
-            </a:lvl4pPr>
-            <a:lvl5pPr eaLnBrk="1" hangingPunct="1">
-              <a:defRPr>
-                <a:solidFill>
-                  <a:schemeClr val="tx2"/>
-                </a:solidFill>
-              </a:defRPr>
-            </a:lvl5pPr>
-            <a:lvl6pPr eaLnBrk="1" hangingPunct="1">
-              <a:defRPr>
-                <a:solidFill>
-                  <a:schemeClr val="tx2"/>
-                </a:solidFill>
-              </a:defRPr>
-            </a:lvl6pPr>
-            <a:lvl7pPr eaLnBrk="1" hangingPunct="1">
-              <a:defRPr>
-                <a:solidFill>
-                  <a:schemeClr val="tx2"/>
-                </a:solidFill>
-              </a:defRPr>
-            </a:lvl7pPr>
-            <a:lvl8pPr eaLnBrk="1" hangingPunct="1">
-              <a:defRPr>
-                <a:solidFill>
-                  <a:schemeClr val="tx2"/>
-                </a:solidFill>
-              </a:defRPr>
-            </a:lvl8pPr>
-            <a:lvl9pPr eaLnBrk="1" hangingPunct="1">
-              <a:defRPr>
-                <a:solidFill>
-                  <a:schemeClr val="tx2"/>
-                </a:solidFill>
-              </a:defRPr>
-            </a:lvl9pPr>
-          </a:lstStyle>
-          <a:p>
-            <a:r>
-              <a:rPr lang="fr-CA" dirty="0">
-                <a:solidFill>
-                  <a:srgbClr val="286D9F"/>
-                </a:solidFill>
-              </a:rPr>
-              <a:t>Fonctionnement de la méthode numérique</a:t>
-            </a:r>
-          </a:p>
-        </p:txBody>
-      </p:sp>
-      <p:sp>
-        <p:nvSpPr>
-          <p:cNvPr id="3" name="Rectangle 2">
-            <a:extLst>
-              <a:ext uri="{FF2B5EF4-FFF2-40B4-BE49-F238E27FC236}">
-                <a16:creationId xmlns:a16="http://schemas.microsoft.com/office/drawing/2014/main" id="{BA0A46BD-0FD2-481A-AB72-F6E2A27E0618}"/>
-              </a:ext>
-            </a:extLst>
-          </p:cNvPr>
-          <p:cNvSpPr/>
-          <p:nvPr/>
-        </p:nvSpPr>
-        <p:spPr>
-          <a:xfrm>
-            <a:off x="2276213" y="2908612"/>
-            <a:ext cx="6096000" cy="1754326"/>
-          </a:xfrm>
-          <a:prstGeom prst="rect">
-            <a:avLst/>
-          </a:prstGeom>
-        </p:spPr>
-        <p:txBody>
-          <a:bodyPr>
-            <a:spAutoFit/>
-          </a:bodyPr>
-          <a:lstStyle/>
-          <a:p>
-            <a:r>
-              <a:rPr lang="fr-FR" dirty="0"/>
-              <a:t>Étapes et fonctionnement de la méthode numérique, en incluant les équations discrétisées telles que vous les avez programmées (ex : discrétisation d’une équation différentielle, condition initiale, conditions aux frontières, calcul de l’énergie d’un système, génération de nombres aléatoires, etc.) </a:t>
-            </a:r>
-            <a:endParaRPr lang="fr-CA" dirty="0"/>
-          </a:p>
-        </p:txBody>
-      </p:sp>
-    </p:spTree>
-    <p:extLst>
-      <p:ext uri="{BB962C8B-B14F-4D97-AF65-F5344CB8AC3E}">
-        <p14:creationId xmlns:p14="http://schemas.microsoft.com/office/powerpoint/2010/main" val="1646786163"/>
-      </p:ext>
-    </p:extLst>
-  </p:cSld>
-  <p:clrMapOvr>
-    <a:masterClrMapping/>
-  </p:clrMapOvr>
-</p:sld>
-</file>
-
 <file path=ppt/slides/slide9.xml><?xml version="1.0" encoding="utf-8"?>
 <p:sld xmlns:a="http://schemas.openxmlformats.org/drawingml/2006/main" xmlns:r="http://schemas.openxmlformats.org/officeDocument/2006/relationships" xmlns:p="http://schemas.openxmlformats.org/presentationml/2006/main">
   <p:cSld>
@@ -15922,7 +17216,7 @@
                   <a:srgbClr val="286D9F"/>
                 </a:solidFill>
               </a:rPr>
-              <a:t>Paramètres de simulation</a:t>
+              <a:t>Fonctionnement de la méthode numérique</a:t>
             </a:r>
           </a:p>
         </p:txBody>
@@ -15941,8 +17235,8 @@
         </p:nvSpPr>
         <p:spPr>
           <a:xfrm>
-            <a:off x="2276213" y="2908612"/>
-            <a:ext cx="6096000" cy="646331"/>
+            <a:off x="3960634" y="1249961"/>
+            <a:ext cx="6096000" cy="1754326"/>
           </a:xfrm>
           <a:prstGeom prst="rect">
             <a:avLst/>
@@ -15956,7 +17250,7 @@
           <a:p>
             <a:r>
               <a:rPr lang="fr-FR" dirty="0"/>
-              <a:t>Paramètres de l’algorithme (ex : pas de discrétisation, critère de convergence, etc.)</a:t>
+              <a:t>Étapes et fonctionnement de la méthode numérique, en incluant les équations discrétisées telles que vous les avez programmées (ex : discrétisation d’une équation différentielle, condition initiale, conditions aux frontières, calcul de l’énergie d’un système, génération de nombres aléatoires, etc.) </a:t>
             </a:r>
             <a:endParaRPr lang="fr-CA" dirty="0"/>
           </a:p>
@@ -15965,7 +17259,7 @@
     </p:spTree>
     <p:extLst>
       <p:ext uri="{BB962C8B-B14F-4D97-AF65-F5344CB8AC3E}">
-        <p14:creationId xmlns:p14="http://schemas.microsoft.com/office/powerpoint/2010/main" val="3922770649"/>
+        <p14:creationId xmlns:p14="http://schemas.microsoft.com/office/powerpoint/2010/main" val="1646786163"/>
       </p:ext>
     </p:extLst>
   </p:cSld>

</xml_diff>